<commit_message>
week 13 slides + lab
</commit_message>
<xml_diff>
--- a/course slides/week_13.pptx
+++ b/course slides/week_13.pptx
@@ -5,28 +5,29 @@
     <p:sldMasterId id="2147483648" r:id="rId1"/>
   </p:sldMasterIdLst>
   <p:notesMasterIdLst>
-    <p:notesMasterId r:id="rId21"/>
+    <p:notesMasterId r:id="rId22"/>
   </p:notesMasterIdLst>
   <p:sldIdLst>
     <p:sldId id="256" r:id="rId2"/>
-    <p:sldId id="289" r:id="rId3"/>
-    <p:sldId id="292" r:id="rId4"/>
-    <p:sldId id="291" r:id="rId5"/>
-    <p:sldId id="290" r:id="rId6"/>
-    <p:sldId id="293" r:id="rId7"/>
-    <p:sldId id="294" r:id="rId8"/>
-    <p:sldId id="295" r:id="rId9"/>
-    <p:sldId id="304" r:id="rId10"/>
-    <p:sldId id="305" r:id="rId11"/>
-    <p:sldId id="296" r:id="rId12"/>
-    <p:sldId id="297" r:id="rId13"/>
-    <p:sldId id="298" r:id="rId14"/>
-    <p:sldId id="299" r:id="rId15"/>
-    <p:sldId id="300" r:id="rId16"/>
-    <p:sldId id="301" r:id="rId17"/>
-    <p:sldId id="302" r:id="rId18"/>
-    <p:sldId id="303" r:id="rId19"/>
-    <p:sldId id="284" r:id="rId20"/>
+    <p:sldId id="306" r:id="rId3"/>
+    <p:sldId id="289" r:id="rId4"/>
+    <p:sldId id="292" r:id="rId5"/>
+    <p:sldId id="291" r:id="rId6"/>
+    <p:sldId id="290" r:id="rId7"/>
+    <p:sldId id="293" r:id="rId8"/>
+    <p:sldId id="294" r:id="rId9"/>
+    <p:sldId id="295" r:id="rId10"/>
+    <p:sldId id="304" r:id="rId11"/>
+    <p:sldId id="305" r:id="rId12"/>
+    <p:sldId id="296" r:id="rId13"/>
+    <p:sldId id="297" r:id="rId14"/>
+    <p:sldId id="298" r:id="rId15"/>
+    <p:sldId id="299" r:id="rId16"/>
+    <p:sldId id="300" r:id="rId17"/>
+    <p:sldId id="301" r:id="rId18"/>
+    <p:sldId id="302" r:id="rId19"/>
+    <p:sldId id="303" r:id="rId20"/>
+    <p:sldId id="284" r:id="rId21"/>
   </p:sldIdLst>
   <p:sldSz cx="12192000" cy="6858000"/>
   <p:notesSz cx="6858000" cy="9144000"/>
@@ -215,7 +216,7 @@
           <a:p>
             <a:fld id="{E7BF058D-E663-3E48-99D5-AFD0BCA1823C}" type="datetimeFigureOut">
               <a:rPr lang="en-US" smtClean="0"/>
-              <a:t>11/15/20</a:t>
+              <a:t>11/16/20</a:t>
             </a:fld>
             <a:endParaRPr lang="en-US"/>
           </a:p>
@@ -576,7 +577,7 @@
           <a:p>
             <a:fld id="{80E982A1-5A81-7746-934C-61A23258E6B4}" type="slidenum">
               <a:rPr lang="en-US" smtClean="0"/>
-              <a:t>2</a:t>
+              <a:t>3</a:t>
             </a:fld>
             <a:endParaRPr lang="en-US"/>
           </a:p>
@@ -677,7 +678,7 @@
           <a:p>
             <a:fld id="{80E982A1-5A81-7746-934C-61A23258E6B4}" type="slidenum">
               <a:rPr lang="en-US" smtClean="0"/>
-              <a:t>11</a:t>
+              <a:t>12</a:t>
             </a:fld>
             <a:endParaRPr lang="en-US"/>
           </a:p>
@@ -778,7 +779,7 @@
           <a:p>
             <a:fld id="{80E982A1-5A81-7746-934C-61A23258E6B4}" type="slidenum">
               <a:rPr lang="en-US" smtClean="0"/>
-              <a:t>12</a:t>
+              <a:t>13</a:t>
             </a:fld>
             <a:endParaRPr lang="en-US"/>
           </a:p>
@@ -879,7 +880,7 @@
           <a:p>
             <a:fld id="{80E982A1-5A81-7746-934C-61A23258E6B4}" type="slidenum">
               <a:rPr lang="en-US" smtClean="0"/>
-              <a:t>13</a:t>
+              <a:t>14</a:t>
             </a:fld>
             <a:endParaRPr lang="en-US"/>
           </a:p>
@@ -992,7 +993,7 @@
           <a:p>
             <a:fld id="{80E982A1-5A81-7746-934C-61A23258E6B4}" type="slidenum">
               <a:rPr lang="en-US" smtClean="0"/>
-              <a:t>14</a:t>
+              <a:t>15</a:t>
             </a:fld>
             <a:endParaRPr lang="en-US"/>
           </a:p>
@@ -1098,7 +1099,7 @@
           <a:p>
             <a:fld id="{80E982A1-5A81-7746-934C-61A23258E6B4}" type="slidenum">
               <a:rPr lang="en-US" smtClean="0"/>
-              <a:t>15</a:t>
+              <a:t>16</a:t>
             </a:fld>
             <a:endParaRPr lang="en-US"/>
           </a:p>
@@ -1183,7 +1184,7 @@
           <a:p>
             <a:fld id="{80E982A1-5A81-7746-934C-61A23258E6B4}" type="slidenum">
               <a:rPr lang="en-US" smtClean="0"/>
-              <a:t>16</a:t>
+              <a:t>17</a:t>
             </a:fld>
             <a:endParaRPr lang="en-US"/>
           </a:p>
@@ -1524,7 +1525,7 @@
           <a:p>
             <a:fld id="{80E982A1-5A81-7746-934C-61A23258E6B4}" type="slidenum">
               <a:rPr lang="en-US" smtClean="0"/>
-              <a:t>17</a:t>
+              <a:t>18</a:t>
             </a:fld>
             <a:endParaRPr lang="en-US"/>
           </a:p>
@@ -1672,7 +1673,7 @@
           <a:p>
             <a:fld id="{80E982A1-5A81-7746-934C-61A23258E6B4}" type="slidenum">
               <a:rPr lang="en-US" smtClean="0"/>
-              <a:t>18</a:t>
+              <a:t>19</a:t>
             </a:fld>
             <a:endParaRPr lang="en-US"/>
           </a:p>
@@ -1756,7 +1757,7 @@
           <a:p>
             <a:fld id="{80E982A1-5A81-7746-934C-61A23258E6B4}" type="slidenum">
               <a:rPr lang="en-US" smtClean="0"/>
-              <a:t>19</a:t>
+              <a:t>20</a:t>
             </a:fld>
             <a:endParaRPr lang="en-US"/>
           </a:p>
@@ -1869,7 +1870,7 @@
           <a:p>
             <a:fld id="{80E982A1-5A81-7746-934C-61A23258E6B4}" type="slidenum">
               <a:rPr lang="en-US" smtClean="0"/>
-              <a:t>3</a:t>
+              <a:t>4</a:t>
             </a:fld>
             <a:endParaRPr lang="en-US"/>
           </a:p>
@@ -1970,7 +1971,7 @@
           <a:p>
             <a:fld id="{80E982A1-5A81-7746-934C-61A23258E6B4}" type="slidenum">
               <a:rPr lang="en-US" smtClean="0"/>
-              <a:t>4</a:t>
+              <a:t>5</a:t>
             </a:fld>
             <a:endParaRPr lang="en-US"/>
           </a:p>
@@ -2207,7 +2208,7 @@
           <a:p>
             <a:fld id="{80E982A1-5A81-7746-934C-61A23258E6B4}" type="slidenum">
               <a:rPr lang="en-US" smtClean="0"/>
-              <a:t>5</a:t>
+              <a:t>6</a:t>
             </a:fld>
             <a:endParaRPr lang="en-US"/>
           </a:p>
@@ -2308,7 +2309,7 @@
           <a:p>
             <a:fld id="{80E982A1-5A81-7746-934C-61A23258E6B4}" type="slidenum">
               <a:rPr lang="en-US" smtClean="0"/>
-              <a:t>6</a:t>
+              <a:t>7</a:t>
             </a:fld>
             <a:endParaRPr lang="en-US"/>
           </a:p>
@@ -2409,7 +2410,7 @@
           <a:p>
             <a:fld id="{80E982A1-5A81-7746-934C-61A23258E6B4}" type="slidenum">
               <a:rPr lang="en-US" smtClean="0"/>
-              <a:t>7</a:t>
+              <a:t>8</a:t>
             </a:fld>
             <a:endParaRPr lang="en-US"/>
           </a:p>
@@ -2972,7 +2973,7 @@
           <a:p>
             <a:fld id="{80E982A1-5A81-7746-934C-61A23258E6B4}" type="slidenum">
               <a:rPr lang="en-US" smtClean="0"/>
-              <a:t>8</a:t>
+              <a:t>9</a:t>
             </a:fld>
             <a:endParaRPr lang="en-US"/>
           </a:p>
@@ -3116,7 +3117,7 @@
           <a:p>
             <a:fld id="{80E982A1-5A81-7746-934C-61A23258E6B4}" type="slidenum">
               <a:rPr lang="en-US" smtClean="0"/>
-              <a:t>9</a:t>
+              <a:t>10</a:t>
             </a:fld>
             <a:endParaRPr lang="en-US"/>
           </a:p>
@@ -3370,7 +3371,7 @@
           <a:p>
             <a:fld id="{80E982A1-5A81-7746-934C-61A23258E6B4}" type="slidenum">
               <a:rPr lang="en-US" smtClean="0"/>
-              <a:t>10</a:t>
+              <a:t>11</a:t>
             </a:fld>
             <a:endParaRPr lang="en-US"/>
           </a:p>
@@ -3536,7 +3537,7 @@
           <a:p>
             <a:fld id="{78A61C02-5DDA-4742-BA9F-16C918E9CF6D}" type="datetime1">
               <a:rPr lang="en-US" smtClean="0"/>
-              <a:t>11/15/20</a:t>
+              <a:t>11/16/20</a:t>
             </a:fld>
             <a:endParaRPr lang="en-US"/>
           </a:p>
@@ -3734,7 +3735,7 @@
           <a:p>
             <a:fld id="{548886B6-90A8-3541-BA71-86E77F56DAB4}" type="datetime1">
               <a:rPr lang="en-US" smtClean="0"/>
-              <a:t>11/15/20</a:t>
+              <a:t>11/16/20</a:t>
             </a:fld>
             <a:endParaRPr lang="en-US"/>
           </a:p>
@@ -3942,7 +3943,7 @@
           <a:p>
             <a:fld id="{852FF3A3-1CCF-A84D-A287-5CAF30DE28F4}" type="datetime1">
               <a:rPr lang="en-US" smtClean="0"/>
-              <a:t>11/15/20</a:t>
+              <a:t>11/16/20</a:t>
             </a:fld>
             <a:endParaRPr lang="en-US"/>
           </a:p>
@@ -4140,7 +4141,7 @@
           <a:p>
             <a:fld id="{8C15019A-578B-EF42-A6FE-609BC777F59C}" type="datetime1">
               <a:rPr lang="en-US" smtClean="0"/>
-              <a:t>11/15/20</a:t>
+              <a:t>11/16/20</a:t>
             </a:fld>
             <a:endParaRPr lang="en-US"/>
           </a:p>
@@ -4415,7 +4416,7 @@
           <a:p>
             <a:fld id="{8CF19FEC-2E87-404D-A86C-ABD7A0A24F55}" type="datetime1">
               <a:rPr lang="en-US" smtClean="0"/>
-              <a:t>11/15/20</a:t>
+              <a:t>11/16/20</a:t>
             </a:fld>
             <a:endParaRPr lang="en-US"/>
           </a:p>
@@ -4680,7 +4681,7 @@
           <a:p>
             <a:fld id="{446EA608-0CB1-7045-BE57-7D86CEA40281}" type="datetime1">
               <a:rPr lang="en-US" smtClean="0"/>
-              <a:t>11/15/20</a:t>
+              <a:t>11/16/20</a:t>
             </a:fld>
             <a:endParaRPr lang="en-US"/>
           </a:p>
@@ -5092,7 +5093,7 @@
           <a:p>
             <a:fld id="{C727496E-E60B-0146-8488-196488F29A43}" type="datetime1">
               <a:rPr lang="en-US" smtClean="0"/>
-              <a:t>11/15/20</a:t>
+              <a:t>11/16/20</a:t>
             </a:fld>
             <a:endParaRPr lang="en-US"/>
           </a:p>
@@ -5233,7 +5234,7 @@
           <a:p>
             <a:fld id="{F546FB0E-EB75-9B48-A4BD-2C5B9A04751D}" type="datetime1">
               <a:rPr lang="en-US" smtClean="0"/>
-              <a:t>11/15/20</a:t>
+              <a:t>11/16/20</a:t>
             </a:fld>
             <a:endParaRPr lang="en-US"/>
           </a:p>
@@ -5346,7 +5347,7 @@
           <a:p>
             <a:fld id="{A456FF61-9A5E-1841-AE70-3D847B065C08}" type="datetime1">
               <a:rPr lang="en-US" smtClean="0"/>
-              <a:t>11/15/20</a:t>
+              <a:t>11/16/20</a:t>
             </a:fld>
             <a:endParaRPr lang="en-US"/>
           </a:p>
@@ -5657,7 +5658,7 @@
           <a:p>
             <a:fld id="{FE8A8F49-DF40-F949-8DE2-65B98C5FEDD7}" type="datetime1">
               <a:rPr lang="en-US" smtClean="0"/>
-              <a:t>11/15/20</a:t>
+              <a:t>11/16/20</a:t>
             </a:fld>
             <a:endParaRPr lang="en-US"/>
           </a:p>
@@ -5945,7 +5946,7 @@
           <a:p>
             <a:fld id="{A85EFE4E-DFE8-4C42-98CC-30B935E5C550}" type="datetime1">
               <a:rPr lang="en-US" smtClean="0"/>
-              <a:t>11/15/20</a:t>
+              <a:t>11/16/20</a:t>
             </a:fld>
             <a:endParaRPr lang="en-US"/>
           </a:p>
@@ -6186,7 +6187,7 @@
           <a:p>
             <a:fld id="{5A0C85FA-79DF-354D-A01A-3E5AA821AAF9}" type="datetime1">
               <a:rPr lang="en-US" smtClean="0"/>
-              <a:t>11/15/20</a:t>
+              <a:t>11/16/20</a:t>
             </a:fld>
             <a:endParaRPr lang="en-US"/>
           </a:p>
@@ -6769,7 +6770,7 @@
           <a:p>
             <a:r>
               <a:rPr lang="en-US" dirty="0"/>
-              <a:t>Feature Selection Methods</a:t>
+              <a:t>Feature Selection</a:t>
             </a:r>
           </a:p>
         </p:txBody>
@@ -7412,39 +7413,49 @@
           </a:lstStyle>
           <a:p>
             <a:r>
-              <a:rPr lang="en-US" b="1" dirty="0"/>
-              <a:t>Univariate Selection: </a:t>
-            </a:r>
-            <a:r>
               <a:rPr lang="en-US" dirty="0"/>
-              <a:t>Statistical tests can be used to select those features that have the strongest relationship with the output variable.</a:t>
-            </a:r>
-          </a:p>
-          <a:p>
-            <a:r>
-              <a:rPr lang="en-US" b="1" dirty="0"/>
-              <a:t>Feature Importance</a:t>
-            </a:r>
+              <a:t>The process where you automatically or manually select those features which contribute most to your prediction variable</a:t>
+            </a:r>
+          </a:p>
+          <a:p>
             <a:r>
               <a:rPr lang="en-US" dirty="0"/>
-              <a:t>: feature importance property of the model</a:t>
-            </a:r>
-          </a:p>
-          <a:p>
-            <a:r>
-              <a:rPr lang="en-US" b="1" dirty="0"/>
-              <a:t>Correlation Matrix</a:t>
-            </a:r>
-          </a:p>
-          <a:p>
-            <a:endParaRPr lang="en-US" dirty="0"/>
+              <a:t>Irrelevant or partially relevant features can negatively impact model performance.</a:t>
+            </a:r>
+          </a:p>
+          <a:p>
+            <a:r>
+              <a:rPr lang="en-US" dirty="0"/>
+              <a:t>Benefits:</a:t>
+            </a:r>
+          </a:p>
+          <a:p>
+            <a:pPr lvl="1"/>
+            <a:r>
+              <a:rPr lang="en-US" dirty="0"/>
+              <a:t>Reduces overfitting</a:t>
+            </a:r>
+          </a:p>
+          <a:p>
+            <a:pPr lvl="1"/>
+            <a:r>
+              <a:rPr lang="en-US" dirty="0"/>
+              <a:t>Improves accuracy</a:t>
+            </a:r>
+          </a:p>
+          <a:p>
+            <a:pPr lvl="1"/>
+            <a:r>
+              <a:rPr lang="en-US" dirty="0"/>
+              <a:t>Reduces training time</a:t>
+            </a:r>
           </a:p>
         </p:txBody>
       </p:sp>
     </p:spTree>
     <p:extLst>
       <p:ext uri="{BB962C8B-B14F-4D97-AF65-F5344CB8AC3E}">
-        <p14:creationId xmlns:p14="http://schemas.microsoft.com/office/powerpoint/2010/main" val="2139462439"/>
+        <p14:creationId xmlns:p14="http://schemas.microsoft.com/office/powerpoint/2010/main" val="109887869"/>
       </p:ext>
     </p:extLst>
   </p:cSld>
@@ -7494,40 +7505,11 @@
           <a:p>
             <a:r>
               <a:rPr lang="en-US" dirty="0"/>
-              <a:t>Feature Encoding – Categorical Variable</a:t>
-            </a:r>
-          </a:p>
-        </p:txBody>
-      </p:sp>
-      <p:pic>
-        <p:nvPicPr>
-          <p:cNvPr id="7" name="Content Placeholder 6">
-            <a:extLst>
-              <a:ext uri="{FF2B5EF4-FFF2-40B4-BE49-F238E27FC236}">
-                <a16:creationId xmlns:a16="http://schemas.microsoft.com/office/drawing/2014/main" id="{80B34EC0-7FD8-B84C-808F-CCA927DA7C29}"/>
-              </a:ext>
-            </a:extLst>
-          </p:cNvPr>
-          <p:cNvPicPr>
-            <a:picLocks noGrp="1" noChangeAspect="1"/>
-          </p:cNvPicPr>
-          <p:nvPr>
-            <p:ph idx="1"/>
-          </p:nvPr>
-        </p:nvPicPr>
-        <p:blipFill>
-          <a:blip r:embed="rId3"/>
-          <a:stretch>
-            <a:fillRect/>
-          </a:stretch>
-        </p:blipFill>
-        <p:spPr>
-          <a:xfrm>
-            <a:off x="1974850" y="1745975"/>
-            <a:ext cx="8242300" cy="4178300"/>
-          </a:xfrm>
-        </p:spPr>
-      </p:pic>
+              <a:t>Feature Selection Methods</a:t>
+            </a:r>
+          </a:p>
+        </p:txBody>
+      </p:sp>
       <p:sp>
         <p:nvSpPr>
           <p:cNvPr id="4" name="Footer Placeholder 3">
@@ -7749,10 +7731,456 @@
           </a:p>
         </p:txBody>
       </p:sp>
+      <p:sp>
+        <p:nvSpPr>
+          <p:cNvPr id="6" name="Content Placeholder 5">
+            <a:extLst>
+              <a:ext uri="{FF2B5EF4-FFF2-40B4-BE49-F238E27FC236}">
+                <a16:creationId xmlns:a16="http://schemas.microsoft.com/office/drawing/2014/main" id="{95B6F104-6E2B-C945-8C45-CFBA33305A08}"/>
+              </a:ext>
+            </a:extLst>
+          </p:cNvPr>
+          <p:cNvSpPr>
+            <a:spLocks noGrp="1"/>
+          </p:cNvSpPr>
+          <p:nvPr>
+            <p:ph idx="1"/>
+          </p:nvPr>
+        </p:nvSpPr>
+        <p:spPr/>
+        <p:txBody>
+          <a:bodyPr/>
+          <a:lstStyle/>
+          <a:p>
+            <a:endParaRPr lang="en-US" dirty="0"/>
+          </a:p>
+          <a:p>
+            <a:endParaRPr lang="en-US" dirty="0"/>
+          </a:p>
+        </p:txBody>
+      </p:sp>
+      <p:sp>
+        <p:nvSpPr>
+          <p:cNvPr id="9" name="Content Placeholder 5">
+            <a:extLst>
+              <a:ext uri="{FF2B5EF4-FFF2-40B4-BE49-F238E27FC236}">
+                <a16:creationId xmlns:a16="http://schemas.microsoft.com/office/drawing/2014/main" id="{713889B6-F6CF-4E46-8347-9663F67039C9}"/>
+              </a:ext>
+            </a:extLst>
+          </p:cNvPr>
+          <p:cNvSpPr txBox="1">
+            <a:spLocks/>
+          </p:cNvSpPr>
+          <p:nvPr/>
+        </p:nvSpPr>
+        <p:spPr>
+          <a:xfrm>
+            <a:off x="990600" y="1978025"/>
+            <a:ext cx="10515600" cy="4351338"/>
+          </a:xfrm>
+          <a:prstGeom prst="rect">
+            <a:avLst/>
+          </a:prstGeom>
+        </p:spPr>
+        <p:txBody>
+          <a:bodyPr vert="horz" lIns="91440" tIns="45720" rIns="91440" bIns="45720" rtlCol="0">
+            <a:normAutofit/>
+          </a:bodyPr>
+          <a:lstStyle>
+            <a:lvl1pPr marL="228600" indent="-228600" algn="l" defTabSz="914400" rtl="0" eaLnBrk="1" latinLnBrk="0" hangingPunct="1">
+              <a:lnSpc>
+                <a:spcPct val="90000"/>
+              </a:lnSpc>
+              <a:spcBef>
+                <a:spcPts val="1000"/>
+              </a:spcBef>
+              <a:buFont typeface="Arial" panose="020B0604020202020204" pitchFamily="34" charset="0"/>
+              <a:buChar char="•"/>
+              <a:defRPr sz="2800" kern="1200">
+                <a:solidFill>
+                  <a:schemeClr val="tx1"/>
+                </a:solidFill>
+                <a:latin typeface="+mn-lt"/>
+                <a:ea typeface="+mn-ea"/>
+                <a:cs typeface="+mn-cs"/>
+              </a:defRPr>
+            </a:lvl1pPr>
+            <a:lvl2pPr marL="685800" indent="-228600" algn="l" defTabSz="914400" rtl="0" eaLnBrk="1" latinLnBrk="0" hangingPunct="1">
+              <a:lnSpc>
+                <a:spcPct val="90000"/>
+              </a:lnSpc>
+              <a:spcBef>
+                <a:spcPts val="500"/>
+              </a:spcBef>
+              <a:buFont typeface="Arial" panose="020B0604020202020204" pitchFamily="34" charset="0"/>
+              <a:buChar char="•"/>
+              <a:defRPr sz="2400" kern="1200">
+                <a:solidFill>
+                  <a:schemeClr val="tx1"/>
+                </a:solidFill>
+                <a:latin typeface="+mn-lt"/>
+                <a:ea typeface="+mn-ea"/>
+                <a:cs typeface="+mn-cs"/>
+              </a:defRPr>
+            </a:lvl2pPr>
+            <a:lvl3pPr marL="1143000" indent="-228600" algn="l" defTabSz="914400" rtl="0" eaLnBrk="1" latinLnBrk="0" hangingPunct="1">
+              <a:lnSpc>
+                <a:spcPct val="90000"/>
+              </a:lnSpc>
+              <a:spcBef>
+                <a:spcPts val="500"/>
+              </a:spcBef>
+              <a:buFont typeface="Arial" panose="020B0604020202020204" pitchFamily="34" charset="0"/>
+              <a:buChar char="•"/>
+              <a:defRPr sz="2000" kern="1200">
+                <a:solidFill>
+                  <a:schemeClr val="tx1"/>
+                </a:solidFill>
+                <a:latin typeface="+mn-lt"/>
+                <a:ea typeface="+mn-ea"/>
+                <a:cs typeface="+mn-cs"/>
+              </a:defRPr>
+            </a:lvl3pPr>
+            <a:lvl4pPr marL="1600200" indent="-228600" algn="l" defTabSz="914400" rtl="0" eaLnBrk="1" latinLnBrk="0" hangingPunct="1">
+              <a:lnSpc>
+                <a:spcPct val="90000"/>
+              </a:lnSpc>
+              <a:spcBef>
+                <a:spcPts val="500"/>
+              </a:spcBef>
+              <a:buFont typeface="Arial" panose="020B0604020202020204" pitchFamily="34" charset="0"/>
+              <a:buChar char="•"/>
+              <a:defRPr sz="1800" kern="1200">
+                <a:solidFill>
+                  <a:schemeClr val="tx1"/>
+                </a:solidFill>
+                <a:latin typeface="+mn-lt"/>
+                <a:ea typeface="+mn-ea"/>
+                <a:cs typeface="+mn-cs"/>
+              </a:defRPr>
+            </a:lvl4pPr>
+            <a:lvl5pPr marL="2057400" indent="-228600" algn="l" defTabSz="914400" rtl="0" eaLnBrk="1" latinLnBrk="0" hangingPunct="1">
+              <a:lnSpc>
+                <a:spcPct val="90000"/>
+              </a:lnSpc>
+              <a:spcBef>
+                <a:spcPts val="500"/>
+              </a:spcBef>
+              <a:buFont typeface="Arial" panose="020B0604020202020204" pitchFamily="34" charset="0"/>
+              <a:buChar char="•"/>
+              <a:defRPr sz="1800" kern="1200">
+                <a:solidFill>
+                  <a:schemeClr val="tx1"/>
+                </a:solidFill>
+                <a:latin typeface="+mn-lt"/>
+                <a:ea typeface="+mn-ea"/>
+                <a:cs typeface="+mn-cs"/>
+              </a:defRPr>
+            </a:lvl5pPr>
+            <a:lvl6pPr marL="2514600" indent="-228600" algn="l" defTabSz="914400" rtl="0" eaLnBrk="1" latinLnBrk="0" hangingPunct="1">
+              <a:lnSpc>
+                <a:spcPct val="90000"/>
+              </a:lnSpc>
+              <a:spcBef>
+                <a:spcPts val="500"/>
+              </a:spcBef>
+              <a:buFont typeface="Arial" panose="020B0604020202020204" pitchFamily="34" charset="0"/>
+              <a:buChar char="•"/>
+              <a:defRPr sz="1800" kern="1200">
+                <a:solidFill>
+                  <a:schemeClr val="tx1"/>
+                </a:solidFill>
+                <a:latin typeface="+mn-lt"/>
+                <a:ea typeface="+mn-ea"/>
+                <a:cs typeface="+mn-cs"/>
+              </a:defRPr>
+            </a:lvl6pPr>
+            <a:lvl7pPr marL="2971800" indent="-228600" algn="l" defTabSz="914400" rtl="0" eaLnBrk="1" latinLnBrk="0" hangingPunct="1">
+              <a:lnSpc>
+                <a:spcPct val="90000"/>
+              </a:lnSpc>
+              <a:spcBef>
+                <a:spcPts val="500"/>
+              </a:spcBef>
+              <a:buFont typeface="Arial" panose="020B0604020202020204" pitchFamily="34" charset="0"/>
+              <a:buChar char="•"/>
+              <a:defRPr sz="1800" kern="1200">
+                <a:solidFill>
+                  <a:schemeClr val="tx1"/>
+                </a:solidFill>
+                <a:latin typeface="+mn-lt"/>
+                <a:ea typeface="+mn-ea"/>
+                <a:cs typeface="+mn-cs"/>
+              </a:defRPr>
+            </a:lvl7pPr>
+            <a:lvl8pPr marL="3429000" indent="-228600" algn="l" defTabSz="914400" rtl="0" eaLnBrk="1" latinLnBrk="0" hangingPunct="1">
+              <a:lnSpc>
+                <a:spcPct val="90000"/>
+              </a:lnSpc>
+              <a:spcBef>
+                <a:spcPts val="500"/>
+              </a:spcBef>
+              <a:buFont typeface="Arial" panose="020B0604020202020204" pitchFamily="34" charset="0"/>
+              <a:buChar char="•"/>
+              <a:defRPr sz="1800" kern="1200">
+                <a:solidFill>
+                  <a:schemeClr val="tx1"/>
+                </a:solidFill>
+                <a:latin typeface="+mn-lt"/>
+                <a:ea typeface="+mn-ea"/>
+                <a:cs typeface="+mn-cs"/>
+              </a:defRPr>
+            </a:lvl8pPr>
+            <a:lvl9pPr marL="3886200" indent="-228600" algn="l" defTabSz="914400" rtl="0" eaLnBrk="1" latinLnBrk="0" hangingPunct="1">
+              <a:lnSpc>
+                <a:spcPct val="90000"/>
+              </a:lnSpc>
+              <a:spcBef>
+                <a:spcPts val="500"/>
+              </a:spcBef>
+              <a:buFont typeface="Arial" panose="020B0604020202020204" pitchFamily="34" charset="0"/>
+              <a:buChar char="•"/>
+              <a:defRPr sz="1800" kern="1200">
+                <a:solidFill>
+                  <a:schemeClr val="tx1"/>
+                </a:solidFill>
+                <a:latin typeface="+mn-lt"/>
+                <a:ea typeface="+mn-ea"/>
+                <a:cs typeface="+mn-cs"/>
+              </a:defRPr>
+            </a:lvl9pPr>
+          </a:lstStyle>
+          <a:p>
+            <a:endParaRPr lang="en-US" dirty="0"/>
+          </a:p>
+        </p:txBody>
+      </p:sp>
+      <p:sp>
+        <p:nvSpPr>
+          <p:cNvPr id="8" name="Content Placeholder 5">
+            <a:extLst>
+              <a:ext uri="{FF2B5EF4-FFF2-40B4-BE49-F238E27FC236}">
+                <a16:creationId xmlns:a16="http://schemas.microsoft.com/office/drawing/2014/main" id="{47A10964-59B1-AA4F-BF68-148D7AE5D94B}"/>
+              </a:ext>
+            </a:extLst>
+          </p:cNvPr>
+          <p:cNvSpPr txBox="1">
+            <a:spLocks/>
+          </p:cNvSpPr>
+          <p:nvPr/>
+        </p:nvSpPr>
+        <p:spPr>
+          <a:xfrm>
+            <a:off x="838200" y="1616145"/>
+            <a:ext cx="10515600" cy="4351338"/>
+          </a:xfrm>
+          <a:prstGeom prst="rect">
+            <a:avLst/>
+          </a:prstGeom>
+        </p:spPr>
+        <p:txBody>
+          <a:bodyPr vert="horz" lIns="91440" tIns="45720" rIns="91440" bIns="45720" rtlCol="0">
+            <a:normAutofit/>
+          </a:bodyPr>
+          <a:lstStyle>
+            <a:lvl1pPr marL="228600" indent="-228600" algn="l" defTabSz="914400" rtl="0" eaLnBrk="1" latinLnBrk="0" hangingPunct="1">
+              <a:lnSpc>
+                <a:spcPct val="90000"/>
+              </a:lnSpc>
+              <a:spcBef>
+                <a:spcPts val="1000"/>
+              </a:spcBef>
+              <a:buFont typeface="Arial" panose="020B0604020202020204" pitchFamily="34" charset="0"/>
+              <a:buChar char="•"/>
+              <a:defRPr sz="2800" kern="1200">
+                <a:solidFill>
+                  <a:schemeClr val="tx1"/>
+                </a:solidFill>
+                <a:latin typeface="+mn-lt"/>
+                <a:ea typeface="+mn-ea"/>
+                <a:cs typeface="+mn-cs"/>
+              </a:defRPr>
+            </a:lvl1pPr>
+            <a:lvl2pPr marL="685800" indent="-228600" algn="l" defTabSz="914400" rtl="0" eaLnBrk="1" latinLnBrk="0" hangingPunct="1">
+              <a:lnSpc>
+                <a:spcPct val="90000"/>
+              </a:lnSpc>
+              <a:spcBef>
+                <a:spcPts val="500"/>
+              </a:spcBef>
+              <a:buFont typeface="Arial" panose="020B0604020202020204" pitchFamily="34" charset="0"/>
+              <a:buChar char="•"/>
+              <a:defRPr sz="2400" kern="1200">
+                <a:solidFill>
+                  <a:schemeClr val="tx1"/>
+                </a:solidFill>
+                <a:latin typeface="+mn-lt"/>
+                <a:ea typeface="+mn-ea"/>
+                <a:cs typeface="+mn-cs"/>
+              </a:defRPr>
+            </a:lvl2pPr>
+            <a:lvl3pPr marL="1143000" indent="-228600" algn="l" defTabSz="914400" rtl="0" eaLnBrk="1" latinLnBrk="0" hangingPunct="1">
+              <a:lnSpc>
+                <a:spcPct val="90000"/>
+              </a:lnSpc>
+              <a:spcBef>
+                <a:spcPts val="500"/>
+              </a:spcBef>
+              <a:buFont typeface="Arial" panose="020B0604020202020204" pitchFamily="34" charset="0"/>
+              <a:buChar char="•"/>
+              <a:defRPr sz="2000" kern="1200">
+                <a:solidFill>
+                  <a:schemeClr val="tx1"/>
+                </a:solidFill>
+                <a:latin typeface="+mn-lt"/>
+                <a:ea typeface="+mn-ea"/>
+                <a:cs typeface="+mn-cs"/>
+              </a:defRPr>
+            </a:lvl3pPr>
+            <a:lvl4pPr marL="1600200" indent="-228600" algn="l" defTabSz="914400" rtl="0" eaLnBrk="1" latinLnBrk="0" hangingPunct="1">
+              <a:lnSpc>
+                <a:spcPct val="90000"/>
+              </a:lnSpc>
+              <a:spcBef>
+                <a:spcPts val="500"/>
+              </a:spcBef>
+              <a:buFont typeface="Arial" panose="020B0604020202020204" pitchFamily="34" charset="0"/>
+              <a:buChar char="•"/>
+              <a:defRPr sz="1800" kern="1200">
+                <a:solidFill>
+                  <a:schemeClr val="tx1"/>
+                </a:solidFill>
+                <a:latin typeface="+mn-lt"/>
+                <a:ea typeface="+mn-ea"/>
+                <a:cs typeface="+mn-cs"/>
+              </a:defRPr>
+            </a:lvl4pPr>
+            <a:lvl5pPr marL="2057400" indent="-228600" algn="l" defTabSz="914400" rtl="0" eaLnBrk="1" latinLnBrk="0" hangingPunct="1">
+              <a:lnSpc>
+                <a:spcPct val="90000"/>
+              </a:lnSpc>
+              <a:spcBef>
+                <a:spcPts val="500"/>
+              </a:spcBef>
+              <a:buFont typeface="Arial" panose="020B0604020202020204" pitchFamily="34" charset="0"/>
+              <a:buChar char="•"/>
+              <a:defRPr sz="1800" kern="1200">
+                <a:solidFill>
+                  <a:schemeClr val="tx1"/>
+                </a:solidFill>
+                <a:latin typeface="+mn-lt"/>
+                <a:ea typeface="+mn-ea"/>
+                <a:cs typeface="+mn-cs"/>
+              </a:defRPr>
+            </a:lvl5pPr>
+            <a:lvl6pPr marL="2514600" indent="-228600" algn="l" defTabSz="914400" rtl="0" eaLnBrk="1" latinLnBrk="0" hangingPunct="1">
+              <a:lnSpc>
+                <a:spcPct val="90000"/>
+              </a:lnSpc>
+              <a:spcBef>
+                <a:spcPts val="500"/>
+              </a:spcBef>
+              <a:buFont typeface="Arial" panose="020B0604020202020204" pitchFamily="34" charset="0"/>
+              <a:buChar char="•"/>
+              <a:defRPr sz="1800" kern="1200">
+                <a:solidFill>
+                  <a:schemeClr val="tx1"/>
+                </a:solidFill>
+                <a:latin typeface="+mn-lt"/>
+                <a:ea typeface="+mn-ea"/>
+                <a:cs typeface="+mn-cs"/>
+              </a:defRPr>
+            </a:lvl6pPr>
+            <a:lvl7pPr marL="2971800" indent="-228600" algn="l" defTabSz="914400" rtl="0" eaLnBrk="1" latinLnBrk="0" hangingPunct="1">
+              <a:lnSpc>
+                <a:spcPct val="90000"/>
+              </a:lnSpc>
+              <a:spcBef>
+                <a:spcPts val="500"/>
+              </a:spcBef>
+              <a:buFont typeface="Arial" panose="020B0604020202020204" pitchFamily="34" charset="0"/>
+              <a:buChar char="•"/>
+              <a:defRPr sz="1800" kern="1200">
+                <a:solidFill>
+                  <a:schemeClr val="tx1"/>
+                </a:solidFill>
+                <a:latin typeface="+mn-lt"/>
+                <a:ea typeface="+mn-ea"/>
+                <a:cs typeface="+mn-cs"/>
+              </a:defRPr>
+            </a:lvl7pPr>
+            <a:lvl8pPr marL="3429000" indent="-228600" algn="l" defTabSz="914400" rtl="0" eaLnBrk="1" latinLnBrk="0" hangingPunct="1">
+              <a:lnSpc>
+                <a:spcPct val="90000"/>
+              </a:lnSpc>
+              <a:spcBef>
+                <a:spcPts val="500"/>
+              </a:spcBef>
+              <a:buFont typeface="Arial" panose="020B0604020202020204" pitchFamily="34" charset="0"/>
+              <a:buChar char="•"/>
+              <a:defRPr sz="1800" kern="1200">
+                <a:solidFill>
+                  <a:schemeClr val="tx1"/>
+                </a:solidFill>
+                <a:latin typeface="+mn-lt"/>
+                <a:ea typeface="+mn-ea"/>
+                <a:cs typeface="+mn-cs"/>
+              </a:defRPr>
+            </a:lvl8pPr>
+            <a:lvl9pPr marL="3886200" indent="-228600" algn="l" defTabSz="914400" rtl="0" eaLnBrk="1" latinLnBrk="0" hangingPunct="1">
+              <a:lnSpc>
+                <a:spcPct val="90000"/>
+              </a:lnSpc>
+              <a:spcBef>
+                <a:spcPts val="500"/>
+              </a:spcBef>
+              <a:buFont typeface="Arial" panose="020B0604020202020204" pitchFamily="34" charset="0"/>
+              <a:buChar char="•"/>
+              <a:defRPr sz="1800" kern="1200">
+                <a:solidFill>
+                  <a:schemeClr val="tx1"/>
+                </a:solidFill>
+                <a:latin typeface="+mn-lt"/>
+                <a:ea typeface="+mn-ea"/>
+                <a:cs typeface="+mn-cs"/>
+              </a:defRPr>
+            </a:lvl9pPr>
+          </a:lstStyle>
+          <a:p>
+            <a:r>
+              <a:rPr lang="en-US" b="1" dirty="0"/>
+              <a:t>Univariate Selection: </a:t>
+            </a:r>
+            <a:r>
+              <a:rPr lang="en-US" dirty="0"/>
+              <a:t>Statistical tests can be used to select those features that have the strongest relationship with the output variable.</a:t>
+            </a:r>
+          </a:p>
+          <a:p>
+            <a:r>
+              <a:rPr lang="en-US" b="1" dirty="0"/>
+              <a:t>Feature Importance</a:t>
+            </a:r>
+            <a:r>
+              <a:rPr lang="en-US" dirty="0"/>
+              <a:t>: feature importance property of the model</a:t>
+            </a:r>
+          </a:p>
+          <a:p>
+            <a:r>
+              <a:rPr lang="en-US" b="1" dirty="0"/>
+              <a:t>Correlation Matrix</a:t>
+            </a:r>
+          </a:p>
+          <a:p>
+            <a:endParaRPr lang="en-US" dirty="0"/>
+          </a:p>
+        </p:txBody>
+      </p:sp>
     </p:spTree>
     <p:extLst>
       <p:ext uri="{BB962C8B-B14F-4D97-AF65-F5344CB8AC3E}">
-        <p14:creationId xmlns:p14="http://schemas.microsoft.com/office/powerpoint/2010/main" val="3982194095"/>
+        <p14:creationId xmlns:p14="http://schemas.microsoft.com/office/powerpoint/2010/main" val="2139462439"/>
       </p:ext>
     </p:extLst>
   </p:cSld>
@@ -7802,7 +8230,7 @@
           <a:p>
             <a:r>
               <a:rPr lang="en-US" dirty="0"/>
-              <a:t>Feature Encoding - Categorical Variable</a:t>
+              <a:t>Feature Encoding – Categorical Variable</a:t>
             </a:r>
           </a:p>
         </p:txBody>
@@ -7825,13 +8253,14 @@
         </p:nvPicPr>
         <p:blipFill>
           <a:blip r:embed="rId3"/>
-          <a:srcRect/>
-          <a:stretch/>
+          <a:stretch>
+            <a:fillRect/>
+          </a:stretch>
         </p:blipFill>
         <p:spPr>
           <a:xfrm>
-            <a:off x="1974850" y="2084310"/>
-            <a:ext cx="8242300" cy="3501630"/>
+            <a:off x="1974850" y="1745975"/>
+            <a:ext cx="8242300" cy="4178300"/>
           </a:xfrm>
         </p:spPr>
       </p:pic>
@@ -8059,7 +8488,7 @@
     </p:spTree>
     <p:extLst>
       <p:ext uri="{BB962C8B-B14F-4D97-AF65-F5344CB8AC3E}">
-        <p14:creationId xmlns:p14="http://schemas.microsoft.com/office/powerpoint/2010/main" val="1799571919"/>
+        <p14:creationId xmlns:p14="http://schemas.microsoft.com/office/powerpoint/2010/main" val="3982194095"/>
       </p:ext>
     </p:extLst>
   </p:cSld>
@@ -8109,11 +8538,39 @@
           <a:p>
             <a:r>
               <a:rPr lang="en-US" dirty="0"/>
-              <a:t>Feature Encoding - Numerical Variable</a:t>
-            </a:r>
-          </a:p>
-        </p:txBody>
-      </p:sp>
+              <a:t>Feature Encoding - Categorical Variable</a:t>
+            </a:r>
+          </a:p>
+        </p:txBody>
+      </p:sp>
+      <p:pic>
+        <p:nvPicPr>
+          <p:cNvPr id="7" name="Content Placeholder 6">
+            <a:extLst>
+              <a:ext uri="{FF2B5EF4-FFF2-40B4-BE49-F238E27FC236}">
+                <a16:creationId xmlns:a16="http://schemas.microsoft.com/office/drawing/2014/main" id="{80B34EC0-7FD8-B84C-808F-CCA927DA7C29}"/>
+              </a:ext>
+            </a:extLst>
+          </p:cNvPr>
+          <p:cNvPicPr>
+            <a:picLocks noGrp="1" noChangeAspect="1"/>
+          </p:cNvPicPr>
+          <p:nvPr>
+            <p:ph idx="1"/>
+          </p:nvPr>
+        </p:nvPicPr>
+        <p:blipFill>
+          <a:blip r:embed="rId3"/>
+          <a:srcRect/>
+          <a:stretch/>
+        </p:blipFill>
+        <p:spPr>
+          <a:xfrm>
+            <a:off x="1974850" y="2084310"/>
+            <a:ext cx="8242300" cy="3501630"/>
+          </a:xfrm>
+        </p:spPr>
+      </p:pic>
       <p:sp>
         <p:nvSpPr>
           <p:cNvPr id="4" name="Footer Placeholder 3">
@@ -8335,56 +8792,10 @@
           </a:p>
         </p:txBody>
       </p:sp>
-      <p:sp>
-        <p:nvSpPr>
-          <p:cNvPr id="6" name="Content Placeholder 5">
-            <a:extLst>
-              <a:ext uri="{FF2B5EF4-FFF2-40B4-BE49-F238E27FC236}">
-                <a16:creationId xmlns:a16="http://schemas.microsoft.com/office/drawing/2014/main" id="{95B6F104-6E2B-C945-8C45-CFBA33305A08}"/>
-              </a:ext>
-            </a:extLst>
-          </p:cNvPr>
-          <p:cNvSpPr>
-            <a:spLocks noGrp="1"/>
-          </p:cNvSpPr>
-          <p:nvPr>
-            <p:ph idx="1"/>
-          </p:nvPr>
-        </p:nvSpPr>
-        <p:spPr/>
-        <p:txBody>
-          <a:bodyPr/>
-          <a:lstStyle/>
-          <a:p>
-            <a:r>
-              <a:rPr lang="en-US" dirty="0"/>
-              <a:t>Binning. Example quantiles (same size population in each bin) or histograms (bins of same size)</a:t>
-            </a:r>
-          </a:p>
-          <a:p>
-            <a:r>
-              <a:rPr lang="en-US" dirty="0"/>
-              <a:t>Dimensionality reduction</a:t>
-            </a:r>
-          </a:p>
-          <a:p>
-            <a:r>
-              <a:rPr lang="en-US" dirty="0"/>
-              <a:t>Clustering and using cluster IDs or/and distances to cluster centers as new features</a:t>
-            </a:r>
-          </a:p>
-          <a:p>
-            <a:endParaRPr lang="en-US" dirty="0"/>
-          </a:p>
-          <a:p>
-            <a:endParaRPr lang="en-US" dirty="0"/>
-          </a:p>
-        </p:txBody>
-      </p:sp>
     </p:spTree>
     <p:extLst>
       <p:ext uri="{BB962C8B-B14F-4D97-AF65-F5344CB8AC3E}">
-        <p14:creationId xmlns:p14="http://schemas.microsoft.com/office/powerpoint/2010/main" val="1619607484"/>
+        <p14:creationId xmlns:p14="http://schemas.microsoft.com/office/powerpoint/2010/main" val="1799571919"/>
       </p:ext>
     </p:extLst>
   </p:cSld>
@@ -8434,7 +8845,7 @@
           <a:p>
             <a:r>
               <a:rPr lang="en-US" dirty="0"/>
-              <a:t>Feature Extraction – Textual Data</a:t>
+              <a:t>Feature Encoding - Numerical Variable</a:t>
             </a:r>
           </a:p>
         </p:txBody>
@@ -8683,42 +9094,20 @@
           <a:p>
             <a:r>
               <a:rPr lang="en-US" dirty="0"/>
-              <a:t>Bag of Words: extract tokens from text and use their occurrences (or TF/IDF weights) as features</a:t>
-            </a:r>
-          </a:p>
-          <a:p>
-            <a:pPr lvl="1"/>
+              <a:t>Binning. Example quantiles (same size population in each bin) or histograms (bins of same size)</a:t>
+            </a:r>
+          </a:p>
+          <a:p>
             <a:r>
               <a:rPr lang="en-US" dirty="0"/>
-              <a:t>Needs NLP techniques like N-grams, Stemming, etc.</a:t>
+              <a:t>Dimensionality reduction</a:t>
             </a:r>
           </a:p>
           <a:p>
             <a:r>
               <a:rPr lang="en-US" dirty="0"/>
-              <a:t>Word Embeddings: Word2Vec, </a:t>
-            </a:r>
-            <a:r>
-              <a:rPr lang="en-US" dirty="0" err="1"/>
-              <a:t>GloVe</a:t>
-            </a:r>
-            <a:r>
-              <a:rPr lang="en-US" dirty="0"/>
-              <a:t>,  BERT, </a:t>
-            </a:r>
-            <a:r>
-              <a:rPr lang="en-US" dirty="0" err="1"/>
-              <a:t>ElMo</a:t>
-            </a:r>
-            <a:r>
-              <a:rPr lang="en-US" dirty="0"/>
-              <a:t>, </a:t>
-            </a:r>
-            <a:r>
-              <a:rPr lang="en-US" dirty="0" err="1"/>
-              <a:t>etc</a:t>
-            </a:r>
-            <a:endParaRPr lang="en-US" dirty="0"/>
+              <a:t>Clustering and using cluster IDs or/and distances to cluster centers as new features</a:t>
+            </a:r>
           </a:p>
           <a:p>
             <a:endParaRPr lang="en-US" dirty="0"/>
@@ -8731,7 +9120,7 @@
     </p:spTree>
     <p:extLst>
       <p:ext uri="{BB962C8B-B14F-4D97-AF65-F5344CB8AC3E}">
-        <p14:creationId xmlns:p14="http://schemas.microsoft.com/office/powerpoint/2010/main" val="1513640044"/>
+        <p14:creationId xmlns:p14="http://schemas.microsoft.com/office/powerpoint/2010/main" val="1619607484"/>
       </p:ext>
     </p:extLst>
   </p:cSld>
@@ -8781,13 +9170,8 @@
           <a:p>
             <a:r>
               <a:rPr lang="en-US" dirty="0"/>
-              <a:t>Feature Extraction – Textual Data - </a:t>
-            </a:r>
-            <a:r>
-              <a:rPr lang="en-US" dirty="0" err="1"/>
-              <a:t>BoW</a:t>
-            </a:r>
-            <a:endParaRPr lang="en-US" dirty="0"/>
+              <a:t>Feature Extraction – Textual Data</a:t>
+            </a:r>
           </a:p>
         </p:txBody>
       </p:sp>
@@ -9033,245 +9417,44 @@
           <a:bodyPr/>
           <a:lstStyle/>
           <a:p>
+            <a:r>
+              <a:rPr lang="en-US" dirty="0"/>
+              <a:t>Bag of Words: extract tokens from text and use their occurrences (or TF/IDF weights) as features</a:t>
+            </a:r>
+          </a:p>
+          <a:p>
+            <a:pPr lvl="1"/>
+            <a:r>
+              <a:rPr lang="en-US" dirty="0"/>
+              <a:t>Needs NLP techniques like N-grams, Stemming, etc.</a:t>
+            </a:r>
+          </a:p>
+          <a:p>
+            <a:r>
+              <a:rPr lang="en-US" dirty="0"/>
+              <a:t>Word Embeddings: Word2Vec, </a:t>
+            </a:r>
+            <a:r>
+              <a:rPr lang="en-US" dirty="0" err="1"/>
+              <a:t>GloVe</a:t>
+            </a:r>
+            <a:r>
+              <a:rPr lang="en-US" dirty="0"/>
+              <a:t>,  BERT, </a:t>
+            </a:r>
+            <a:r>
+              <a:rPr lang="en-US" dirty="0" err="1"/>
+              <a:t>ElMo</a:t>
+            </a:r>
+            <a:r>
+              <a:rPr lang="en-US" dirty="0"/>
+              <a:t>, </a:t>
+            </a:r>
+            <a:r>
+              <a:rPr lang="en-US" dirty="0" err="1"/>
+              <a:t>etc</a:t>
+            </a:r>
             <a:endParaRPr lang="en-US" dirty="0"/>
-          </a:p>
-          <a:p>
-            <a:endParaRPr lang="en-US" dirty="0"/>
-          </a:p>
-        </p:txBody>
-      </p:sp>
-      <p:pic>
-        <p:nvPicPr>
-          <p:cNvPr id="7" name="Picture 6">
-            <a:extLst>
-              <a:ext uri="{FF2B5EF4-FFF2-40B4-BE49-F238E27FC236}">
-                <a16:creationId xmlns:a16="http://schemas.microsoft.com/office/drawing/2014/main" id="{686A9D35-8C5A-B943-B93D-D59665F13C96}"/>
-              </a:ext>
-            </a:extLst>
-          </p:cNvPr>
-          <p:cNvPicPr>
-            <a:picLocks noChangeAspect="1"/>
-          </p:cNvPicPr>
-          <p:nvPr/>
-        </p:nvPicPr>
-        <p:blipFill>
-          <a:blip r:embed="rId3"/>
-          <a:stretch>
-            <a:fillRect/>
-          </a:stretch>
-        </p:blipFill>
-        <p:spPr>
-          <a:xfrm>
-            <a:off x="6369326" y="1695934"/>
-            <a:ext cx="3568148" cy="4189871"/>
-          </a:xfrm>
-          <a:prstGeom prst="rect">
-            <a:avLst/>
-          </a:prstGeom>
-        </p:spPr>
-      </p:pic>
-      <p:sp>
-        <p:nvSpPr>
-          <p:cNvPr id="9" name="Content Placeholder 5">
-            <a:extLst>
-              <a:ext uri="{FF2B5EF4-FFF2-40B4-BE49-F238E27FC236}">
-                <a16:creationId xmlns:a16="http://schemas.microsoft.com/office/drawing/2014/main" id="{713889B6-F6CF-4E46-8347-9663F67039C9}"/>
-              </a:ext>
-            </a:extLst>
-          </p:cNvPr>
-          <p:cNvSpPr txBox="1">
-            <a:spLocks/>
-          </p:cNvSpPr>
-          <p:nvPr/>
-        </p:nvSpPr>
-        <p:spPr>
-          <a:xfrm>
-            <a:off x="990600" y="1978025"/>
-            <a:ext cx="10515600" cy="4351338"/>
-          </a:xfrm>
-          <a:prstGeom prst="rect">
-            <a:avLst/>
-          </a:prstGeom>
-        </p:spPr>
-        <p:txBody>
-          <a:bodyPr vert="horz" lIns="91440" tIns="45720" rIns="91440" bIns="45720" rtlCol="0">
-            <a:normAutofit/>
-          </a:bodyPr>
-          <a:lstStyle>
-            <a:lvl1pPr marL="228600" indent="-228600" algn="l" defTabSz="914400" rtl="0" eaLnBrk="1" latinLnBrk="0" hangingPunct="1">
-              <a:lnSpc>
-                <a:spcPct val="90000"/>
-              </a:lnSpc>
-              <a:spcBef>
-                <a:spcPts val="1000"/>
-              </a:spcBef>
-              <a:buFont typeface="Arial" panose="020B0604020202020204" pitchFamily="34" charset="0"/>
-              <a:buChar char="•"/>
-              <a:defRPr sz="2800" kern="1200">
-                <a:solidFill>
-                  <a:schemeClr val="tx1"/>
-                </a:solidFill>
-                <a:latin typeface="+mn-lt"/>
-                <a:ea typeface="+mn-ea"/>
-                <a:cs typeface="+mn-cs"/>
-              </a:defRPr>
-            </a:lvl1pPr>
-            <a:lvl2pPr marL="685800" indent="-228600" algn="l" defTabSz="914400" rtl="0" eaLnBrk="1" latinLnBrk="0" hangingPunct="1">
-              <a:lnSpc>
-                <a:spcPct val="90000"/>
-              </a:lnSpc>
-              <a:spcBef>
-                <a:spcPts val="500"/>
-              </a:spcBef>
-              <a:buFont typeface="Arial" panose="020B0604020202020204" pitchFamily="34" charset="0"/>
-              <a:buChar char="•"/>
-              <a:defRPr sz="2400" kern="1200">
-                <a:solidFill>
-                  <a:schemeClr val="tx1"/>
-                </a:solidFill>
-                <a:latin typeface="+mn-lt"/>
-                <a:ea typeface="+mn-ea"/>
-                <a:cs typeface="+mn-cs"/>
-              </a:defRPr>
-            </a:lvl2pPr>
-            <a:lvl3pPr marL="1143000" indent="-228600" algn="l" defTabSz="914400" rtl="0" eaLnBrk="1" latinLnBrk="0" hangingPunct="1">
-              <a:lnSpc>
-                <a:spcPct val="90000"/>
-              </a:lnSpc>
-              <a:spcBef>
-                <a:spcPts val="500"/>
-              </a:spcBef>
-              <a:buFont typeface="Arial" panose="020B0604020202020204" pitchFamily="34" charset="0"/>
-              <a:buChar char="•"/>
-              <a:defRPr sz="2000" kern="1200">
-                <a:solidFill>
-                  <a:schemeClr val="tx1"/>
-                </a:solidFill>
-                <a:latin typeface="+mn-lt"/>
-                <a:ea typeface="+mn-ea"/>
-                <a:cs typeface="+mn-cs"/>
-              </a:defRPr>
-            </a:lvl3pPr>
-            <a:lvl4pPr marL="1600200" indent="-228600" algn="l" defTabSz="914400" rtl="0" eaLnBrk="1" latinLnBrk="0" hangingPunct="1">
-              <a:lnSpc>
-                <a:spcPct val="90000"/>
-              </a:lnSpc>
-              <a:spcBef>
-                <a:spcPts val="500"/>
-              </a:spcBef>
-              <a:buFont typeface="Arial" panose="020B0604020202020204" pitchFamily="34" charset="0"/>
-              <a:buChar char="•"/>
-              <a:defRPr sz="1800" kern="1200">
-                <a:solidFill>
-                  <a:schemeClr val="tx1"/>
-                </a:solidFill>
-                <a:latin typeface="+mn-lt"/>
-                <a:ea typeface="+mn-ea"/>
-                <a:cs typeface="+mn-cs"/>
-              </a:defRPr>
-            </a:lvl4pPr>
-            <a:lvl5pPr marL="2057400" indent="-228600" algn="l" defTabSz="914400" rtl="0" eaLnBrk="1" latinLnBrk="0" hangingPunct="1">
-              <a:lnSpc>
-                <a:spcPct val="90000"/>
-              </a:lnSpc>
-              <a:spcBef>
-                <a:spcPts val="500"/>
-              </a:spcBef>
-              <a:buFont typeface="Arial" panose="020B0604020202020204" pitchFamily="34" charset="0"/>
-              <a:buChar char="•"/>
-              <a:defRPr sz="1800" kern="1200">
-                <a:solidFill>
-                  <a:schemeClr val="tx1"/>
-                </a:solidFill>
-                <a:latin typeface="+mn-lt"/>
-                <a:ea typeface="+mn-ea"/>
-                <a:cs typeface="+mn-cs"/>
-              </a:defRPr>
-            </a:lvl5pPr>
-            <a:lvl6pPr marL="2514600" indent="-228600" algn="l" defTabSz="914400" rtl="0" eaLnBrk="1" latinLnBrk="0" hangingPunct="1">
-              <a:lnSpc>
-                <a:spcPct val="90000"/>
-              </a:lnSpc>
-              <a:spcBef>
-                <a:spcPts val="500"/>
-              </a:spcBef>
-              <a:buFont typeface="Arial" panose="020B0604020202020204" pitchFamily="34" charset="0"/>
-              <a:buChar char="•"/>
-              <a:defRPr sz="1800" kern="1200">
-                <a:solidFill>
-                  <a:schemeClr val="tx1"/>
-                </a:solidFill>
-                <a:latin typeface="+mn-lt"/>
-                <a:ea typeface="+mn-ea"/>
-                <a:cs typeface="+mn-cs"/>
-              </a:defRPr>
-            </a:lvl6pPr>
-            <a:lvl7pPr marL="2971800" indent="-228600" algn="l" defTabSz="914400" rtl="0" eaLnBrk="1" latinLnBrk="0" hangingPunct="1">
-              <a:lnSpc>
-                <a:spcPct val="90000"/>
-              </a:lnSpc>
-              <a:spcBef>
-                <a:spcPts val="500"/>
-              </a:spcBef>
-              <a:buFont typeface="Arial" panose="020B0604020202020204" pitchFamily="34" charset="0"/>
-              <a:buChar char="•"/>
-              <a:defRPr sz="1800" kern="1200">
-                <a:solidFill>
-                  <a:schemeClr val="tx1"/>
-                </a:solidFill>
-                <a:latin typeface="+mn-lt"/>
-                <a:ea typeface="+mn-ea"/>
-                <a:cs typeface="+mn-cs"/>
-              </a:defRPr>
-            </a:lvl7pPr>
-            <a:lvl8pPr marL="3429000" indent="-228600" algn="l" defTabSz="914400" rtl="0" eaLnBrk="1" latinLnBrk="0" hangingPunct="1">
-              <a:lnSpc>
-                <a:spcPct val="90000"/>
-              </a:lnSpc>
-              <a:spcBef>
-                <a:spcPts val="500"/>
-              </a:spcBef>
-              <a:buFont typeface="Arial" panose="020B0604020202020204" pitchFamily="34" charset="0"/>
-              <a:buChar char="•"/>
-              <a:defRPr sz="1800" kern="1200">
-                <a:solidFill>
-                  <a:schemeClr val="tx1"/>
-                </a:solidFill>
-                <a:latin typeface="+mn-lt"/>
-                <a:ea typeface="+mn-ea"/>
-                <a:cs typeface="+mn-cs"/>
-              </a:defRPr>
-            </a:lvl8pPr>
-            <a:lvl9pPr marL="3886200" indent="-228600" algn="l" defTabSz="914400" rtl="0" eaLnBrk="1" latinLnBrk="0" hangingPunct="1">
-              <a:lnSpc>
-                <a:spcPct val="90000"/>
-              </a:lnSpc>
-              <a:spcBef>
-                <a:spcPts val="500"/>
-              </a:spcBef>
-              <a:buFont typeface="Arial" panose="020B0604020202020204" pitchFamily="34" charset="0"/>
-              <a:buChar char="•"/>
-              <a:defRPr sz="1800" kern="1200">
-                <a:solidFill>
-                  <a:schemeClr val="tx1"/>
-                </a:solidFill>
-                <a:latin typeface="+mn-lt"/>
-                <a:ea typeface="+mn-ea"/>
-                <a:cs typeface="+mn-cs"/>
-              </a:defRPr>
-            </a:lvl9pPr>
-          </a:lstStyle>
-          <a:p>
-            <a:r>
-              <a:rPr lang="en-US" dirty="0"/>
-              <a:t>A vocabulary of known words</a:t>
-            </a:r>
-          </a:p>
-          <a:p>
-            <a:r>
-              <a:rPr lang="en-US" dirty="0"/>
-              <a:t>A measure of the presence of known words</a:t>
-            </a:r>
           </a:p>
           <a:p>
             <a:endParaRPr lang="en-US" dirty="0"/>
@@ -9284,7 +9467,7 @@
     </p:spTree>
     <p:extLst>
       <p:ext uri="{BB962C8B-B14F-4D97-AF65-F5344CB8AC3E}">
-        <p14:creationId xmlns:p14="http://schemas.microsoft.com/office/powerpoint/2010/main" val="3808622864"/>
+        <p14:creationId xmlns:p14="http://schemas.microsoft.com/office/powerpoint/2010/main" val="1513640044"/>
       </p:ext>
     </p:extLst>
   </p:cSld>
@@ -9834,6 +10017,559 @@
           </a:p>
         </p:txBody>
       </p:sp>
+    </p:spTree>
+    <p:extLst>
+      <p:ext uri="{BB962C8B-B14F-4D97-AF65-F5344CB8AC3E}">
+        <p14:creationId xmlns:p14="http://schemas.microsoft.com/office/powerpoint/2010/main" val="3808622864"/>
+      </p:ext>
+    </p:extLst>
+  </p:cSld>
+  <p:clrMapOvr>
+    <a:masterClrMapping/>
+  </p:clrMapOvr>
+</p:sld>
+</file>
+
+<file path=ppt/slides/slide17.xml><?xml version="1.0" encoding="utf-8"?>
+<p:sld xmlns:a="http://schemas.openxmlformats.org/drawingml/2006/main" xmlns:r="http://schemas.openxmlformats.org/officeDocument/2006/relationships" xmlns:p="http://schemas.openxmlformats.org/presentationml/2006/main">
+  <p:cSld>
+    <p:spTree>
+      <p:nvGrpSpPr>
+        <p:cNvPr id="1" name=""/>
+        <p:cNvGrpSpPr/>
+        <p:nvPr/>
+      </p:nvGrpSpPr>
+      <p:grpSpPr>
+        <a:xfrm>
+          <a:off x="0" y="0"/>
+          <a:ext cx="0" cy="0"/>
+          <a:chOff x="0" y="0"/>
+          <a:chExt cx="0" cy="0"/>
+        </a:xfrm>
+      </p:grpSpPr>
+      <p:sp>
+        <p:nvSpPr>
+          <p:cNvPr id="2" name="Title 1">
+            <a:extLst>
+              <a:ext uri="{FF2B5EF4-FFF2-40B4-BE49-F238E27FC236}">
+                <a16:creationId xmlns:a16="http://schemas.microsoft.com/office/drawing/2014/main" id="{E8CE72FC-A0E8-974A-9B4E-6CCA77EDC43A}"/>
+              </a:ext>
+            </a:extLst>
+          </p:cNvPr>
+          <p:cNvSpPr>
+            <a:spLocks noGrp="1"/>
+          </p:cNvSpPr>
+          <p:nvPr>
+            <p:ph type="title"/>
+          </p:nvPr>
+        </p:nvSpPr>
+        <p:spPr/>
+        <p:txBody>
+          <a:bodyPr/>
+          <a:lstStyle/>
+          <a:p>
+            <a:r>
+              <a:rPr lang="en-US" dirty="0"/>
+              <a:t>Feature Extraction – Textual Data - </a:t>
+            </a:r>
+            <a:r>
+              <a:rPr lang="en-US" dirty="0" err="1"/>
+              <a:t>BoW</a:t>
+            </a:r>
+            <a:endParaRPr lang="en-US" dirty="0"/>
+          </a:p>
+        </p:txBody>
+      </p:sp>
+      <p:sp>
+        <p:nvSpPr>
+          <p:cNvPr id="4" name="Footer Placeholder 3">
+            <a:extLst>
+              <a:ext uri="{FF2B5EF4-FFF2-40B4-BE49-F238E27FC236}">
+                <a16:creationId xmlns:a16="http://schemas.microsoft.com/office/drawing/2014/main" id="{93DEADD6-0570-A44F-8ECB-1BA4A9AAEF2D}"/>
+              </a:ext>
+            </a:extLst>
+          </p:cNvPr>
+          <p:cNvSpPr>
+            <a:spLocks noGrp="1"/>
+          </p:cNvSpPr>
+          <p:nvPr>
+            <p:ph type="ftr" sz="quarter" idx="11"/>
+          </p:nvPr>
+        </p:nvSpPr>
+        <p:spPr/>
+        <p:txBody>
+          <a:bodyPr/>
+          <a:lstStyle/>
+          <a:p>
+            <a:endParaRPr lang="en-US"/>
+          </a:p>
+        </p:txBody>
+      </p:sp>
+      <p:sp>
+        <p:nvSpPr>
+          <p:cNvPr id="5" name="Content Placeholder 2">
+            <a:extLst>
+              <a:ext uri="{FF2B5EF4-FFF2-40B4-BE49-F238E27FC236}">
+                <a16:creationId xmlns:a16="http://schemas.microsoft.com/office/drawing/2014/main" id="{95511CA2-B533-484B-BB6D-BD44FEB692DB}"/>
+              </a:ext>
+            </a:extLst>
+          </p:cNvPr>
+          <p:cNvSpPr txBox="1">
+            <a:spLocks/>
+          </p:cNvSpPr>
+          <p:nvPr/>
+        </p:nvSpPr>
+        <p:spPr>
+          <a:xfrm>
+            <a:off x="990600" y="1572937"/>
+            <a:ext cx="10515600" cy="4351338"/>
+          </a:xfrm>
+          <a:prstGeom prst="rect">
+            <a:avLst/>
+          </a:prstGeom>
+        </p:spPr>
+        <p:txBody>
+          <a:bodyPr vert="horz" lIns="91440" tIns="45720" rIns="91440" bIns="45720" rtlCol="0">
+            <a:normAutofit/>
+          </a:bodyPr>
+          <a:lstStyle>
+            <a:lvl1pPr marL="228600" indent="-228600" algn="l" defTabSz="914400" rtl="0" eaLnBrk="1" latinLnBrk="0" hangingPunct="1">
+              <a:lnSpc>
+                <a:spcPct val="90000"/>
+              </a:lnSpc>
+              <a:spcBef>
+                <a:spcPts val="1000"/>
+              </a:spcBef>
+              <a:buFont typeface="Arial" panose="020B0604020202020204" pitchFamily="34" charset="0"/>
+              <a:buChar char="•"/>
+              <a:defRPr sz="2800" kern="1200">
+                <a:solidFill>
+                  <a:schemeClr val="tx1"/>
+                </a:solidFill>
+                <a:latin typeface="+mn-lt"/>
+                <a:ea typeface="+mn-ea"/>
+                <a:cs typeface="+mn-cs"/>
+              </a:defRPr>
+            </a:lvl1pPr>
+            <a:lvl2pPr marL="685800" indent="-228600" algn="l" defTabSz="914400" rtl="0" eaLnBrk="1" latinLnBrk="0" hangingPunct="1">
+              <a:lnSpc>
+                <a:spcPct val="90000"/>
+              </a:lnSpc>
+              <a:spcBef>
+                <a:spcPts val="500"/>
+              </a:spcBef>
+              <a:buFont typeface="Arial" panose="020B0604020202020204" pitchFamily="34" charset="0"/>
+              <a:buChar char="•"/>
+              <a:defRPr sz="2400" kern="1200">
+                <a:solidFill>
+                  <a:schemeClr val="tx1"/>
+                </a:solidFill>
+                <a:latin typeface="+mn-lt"/>
+                <a:ea typeface="+mn-ea"/>
+                <a:cs typeface="+mn-cs"/>
+              </a:defRPr>
+            </a:lvl2pPr>
+            <a:lvl3pPr marL="1143000" indent="-228600" algn="l" defTabSz="914400" rtl="0" eaLnBrk="1" latinLnBrk="0" hangingPunct="1">
+              <a:lnSpc>
+                <a:spcPct val="90000"/>
+              </a:lnSpc>
+              <a:spcBef>
+                <a:spcPts val="500"/>
+              </a:spcBef>
+              <a:buFont typeface="Arial" panose="020B0604020202020204" pitchFamily="34" charset="0"/>
+              <a:buChar char="•"/>
+              <a:defRPr sz="2000" kern="1200">
+                <a:solidFill>
+                  <a:schemeClr val="tx1"/>
+                </a:solidFill>
+                <a:latin typeface="+mn-lt"/>
+                <a:ea typeface="+mn-ea"/>
+                <a:cs typeface="+mn-cs"/>
+              </a:defRPr>
+            </a:lvl3pPr>
+            <a:lvl4pPr marL="1600200" indent="-228600" algn="l" defTabSz="914400" rtl="0" eaLnBrk="1" latinLnBrk="0" hangingPunct="1">
+              <a:lnSpc>
+                <a:spcPct val="90000"/>
+              </a:lnSpc>
+              <a:spcBef>
+                <a:spcPts val="500"/>
+              </a:spcBef>
+              <a:buFont typeface="Arial" panose="020B0604020202020204" pitchFamily="34" charset="0"/>
+              <a:buChar char="•"/>
+              <a:defRPr sz="1800" kern="1200">
+                <a:solidFill>
+                  <a:schemeClr val="tx1"/>
+                </a:solidFill>
+                <a:latin typeface="+mn-lt"/>
+                <a:ea typeface="+mn-ea"/>
+                <a:cs typeface="+mn-cs"/>
+              </a:defRPr>
+            </a:lvl4pPr>
+            <a:lvl5pPr marL="2057400" indent="-228600" algn="l" defTabSz="914400" rtl="0" eaLnBrk="1" latinLnBrk="0" hangingPunct="1">
+              <a:lnSpc>
+                <a:spcPct val="90000"/>
+              </a:lnSpc>
+              <a:spcBef>
+                <a:spcPts val="500"/>
+              </a:spcBef>
+              <a:buFont typeface="Arial" panose="020B0604020202020204" pitchFamily="34" charset="0"/>
+              <a:buChar char="•"/>
+              <a:defRPr sz="1800" kern="1200">
+                <a:solidFill>
+                  <a:schemeClr val="tx1"/>
+                </a:solidFill>
+                <a:latin typeface="+mn-lt"/>
+                <a:ea typeface="+mn-ea"/>
+                <a:cs typeface="+mn-cs"/>
+              </a:defRPr>
+            </a:lvl5pPr>
+            <a:lvl6pPr marL="2514600" indent="-228600" algn="l" defTabSz="914400" rtl="0" eaLnBrk="1" latinLnBrk="0" hangingPunct="1">
+              <a:lnSpc>
+                <a:spcPct val="90000"/>
+              </a:lnSpc>
+              <a:spcBef>
+                <a:spcPts val="500"/>
+              </a:spcBef>
+              <a:buFont typeface="Arial" panose="020B0604020202020204" pitchFamily="34" charset="0"/>
+              <a:buChar char="•"/>
+              <a:defRPr sz="1800" kern="1200">
+                <a:solidFill>
+                  <a:schemeClr val="tx1"/>
+                </a:solidFill>
+                <a:latin typeface="+mn-lt"/>
+                <a:ea typeface="+mn-ea"/>
+                <a:cs typeface="+mn-cs"/>
+              </a:defRPr>
+            </a:lvl6pPr>
+            <a:lvl7pPr marL="2971800" indent="-228600" algn="l" defTabSz="914400" rtl="0" eaLnBrk="1" latinLnBrk="0" hangingPunct="1">
+              <a:lnSpc>
+                <a:spcPct val="90000"/>
+              </a:lnSpc>
+              <a:spcBef>
+                <a:spcPts val="500"/>
+              </a:spcBef>
+              <a:buFont typeface="Arial" panose="020B0604020202020204" pitchFamily="34" charset="0"/>
+              <a:buChar char="•"/>
+              <a:defRPr sz="1800" kern="1200">
+                <a:solidFill>
+                  <a:schemeClr val="tx1"/>
+                </a:solidFill>
+                <a:latin typeface="+mn-lt"/>
+                <a:ea typeface="+mn-ea"/>
+                <a:cs typeface="+mn-cs"/>
+              </a:defRPr>
+            </a:lvl7pPr>
+            <a:lvl8pPr marL="3429000" indent="-228600" algn="l" defTabSz="914400" rtl="0" eaLnBrk="1" latinLnBrk="0" hangingPunct="1">
+              <a:lnSpc>
+                <a:spcPct val="90000"/>
+              </a:lnSpc>
+              <a:spcBef>
+                <a:spcPts val="500"/>
+              </a:spcBef>
+              <a:buFont typeface="Arial" panose="020B0604020202020204" pitchFamily="34" charset="0"/>
+              <a:buChar char="•"/>
+              <a:defRPr sz="1800" kern="1200">
+                <a:solidFill>
+                  <a:schemeClr val="tx1"/>
+                </a:solidFill>
+                <a:latin typeface="+mn-lt"/>
+                <a:ea typeface="+mn-ea"/>
+                <a:cs typeface="+mn-cs"/>
+              </a:defRPr>
+            </a:lvl8pPr>
+            <a:lvl9pPr marL="3886200" indent="-228600" algn="l" defTabSz="914400" rtl="0" eaLnBrk="1" latinLnBrk="0" hangingPunct="1">
+              <a:lnSpc>
+                <a:spcPct val="90000"/>
+              </a:lnSpc>
+              <a:spcBef>
+                <a:spcPts val="500"/>
+              </a:spcBef>
+              <a:buFont typeface="Arial" panose="020B0604020202020204" pitchFamily="34" charset="0"/>
+              <a:buChar char="•"/>
+              <a:defRPr sz="1800" kern="1200">
+                <a:solidFill>
+                  <a:schemeClr val="tx1"/>
+                </a:solidFill>
+                <a:latin typeface="+mn-lt"/>
+                <a:ea typeface="+mn-ea"/>
+                <a:cs typeface="+mn-cs"/>
+              </a:defRPr>
+            </a:lvl9pPr>
+          </a:lstStyle>
+          <a:p>
+            <a:endParaRPr lang="en-US" dirty="0"/>
+          </a:p>
+        </p:txBody>
+      </p:sp>
+      <p:sp>
+        <p:nvSpPr>
+          <p:cNvPr id="6" name="Content Placeholder 5">
+            <a:extLst>
+              <a:ext uri="{FF2B5EF4-FFF2-40B4-BE49-F238E27FC236}">
+                <a16:creationId xmlns:a16="http://schemas.microsoft.com/office/drawing/2014/main" id="{95B6F104-6E2B-C945-8C45-CFBA33305A08}"/>
+              </a:ext>
+            </a:extLst>
+          </p:cNvPr>
+          <p:cNvSpPr>
+            <a:spLocks noGrp="1"/>
+          </p:cNvSpPr>
+          <p:nvPr>
+            <p:ph idx="1"/>
+          </p:nvPr>
+        </p:nvSpPr>
+        <p:spPr/>
+        <p:txBody>
+          <a:bodyPr/>
+          <a:lstStyle/>
+          <a:p>
+            <a:endParaRPr lang="en-US" dirty="0"/>
+          </a:p>
+          <a:p>
+            <a:endParaRPr lang="en-US" dirty="0"/>
+          </a:p>
+        </p:txBody>
+      </p:sp>
+      <p:pic>
+        <p:nvPicPr>
+          <p:cNvPr id="7" name="Picture 6">
+            <a:extLst>
+              <a:ext uri="{FF2B5EF4-FFF2-40B4-BE49-F238E27FC236}">
+                <a16:creationId xmlns:a16="http://schemas.microsoft.com/office/drawing/2014/main" id="{686A9D35-8C5A-B943-B93D-D59665F13C96}"/>
+              </a:ext>
+            </a:extLst>
+          </p:cNvPr>
+          <p:cNvPicPr>
+            <a:picLocks noChangeAspect="1"/>
+          </p:cNvPicPr>
+          <p:nvPr/>
+        </p:nvPicPr>
+        <p:blipFill>
+          <a:blip r:embed="rId3"/>
+          <a:stretch>
+            <a:fillRect/>
+          </a:stretch>
+        </p:blipFill>
+        <p:spPr>
+          <a:xfrm>
+            <a:off x="6369326" y="1695934"/>
+            <a:ext cx="3568148" cy="4189871"/>
+          </a:xfrm>
+          <a:prstGeom prst="rect">
+            <a:avLst/>
+          </a:prstGeom>
+        </p:spPr>
+      </p:pic>
+      <p:sp>
+        <p:nvSpPr>
+          <p:cNvPr id="9" name="Content Placeholder 5">
+            <a:extLst>
+              <a:ext uri="{FF2B5EF4-FFF2-40B4-BE49-F238E27FC236}">
+                <a16:creationId xmlns:a16="http://schemas.microsoft.com/office/drawing/2014/main" id="{713889B6-F6CF-4E46-8347-9663F67039C9}"/>
+              </a:ext>
+            </a:extLst>
+          </p:cNvPr>
+          <p:cNvSpPr txBox="1">
+            <a:spLocks/>
+          </p:cNvSpPr>
+          <p:nvPr/>
+        </p:nvSpPr>
+        <p:spPr>
+          <a:xfrm>
+            <a:off x="990600" y="1978025"/>
+            <a:ext cx="10515600" cy="4351338"/>
+          </a:xfrm>
+          <a:prstGeom prst="rect">
+            <a:avLst/>
+          </a:prstGeom>
+        </p:spPr>
+        <p:txBody>
+          <a:bodyPr vert="horz" lIns="91440" tIns="45720" rIns="91440" bIns="45720" rtlCol="0">
+            <a:normAutofit/>
+          </a:bodyPr>
+          <a:lstStyle>
+            <a:lvl1pPr marL="228600" indent="-228600" algn="l" defTabSz="914400" rtl="0" eaLnBrk="1" latinLnBrk="0" hangingPunct="1">
+              <a:lnSpc>
+                <a:spcPct val="90000"/>
+              </a:lnSpc>
+              <a:spcBef>
+                <a:spcPts val="1000"/>
+              </a:spcBef>
+              <a:buFont typeface="Arial" panose="020B0604020202020204" pitchFamily="34" charset="0"/>
+              <a:buChar char="•"/>
+              <a:defRPr sz="2800" kern="1200">
+                <a:solidFill>
+                  <a:schemeClr val="tx1"/>
+                </a:solidFill>
+                <a:latin typeface="+mn-lt"/>
+                <a:ea typeface="+mn-ea"/>
+                <a:cs typeface="+mn-cs"/>
+              </a:defRPr>
+            </a:lvl1pPr>
+            <a:lvl2pPr marL="685800" indent="-228600" algn="l" defTabSz="914400" rtl="0" eaLnBrk="1" latinLnBrk="0" hangingPunct="1">
+              <a:lnSpc>
+                <a:spcPct val="90000"/>
+              </a:lnSpc>
+              <a:spcBef>
+                <a:spcPts val="500"/>
+              </a:spcBef>
+              <a:buFont typeface="Arial" panose="020B0604020202020204" pitchFamily="34" charset="0"/>
+              <a:buChar char="•"/>
+              <a:defRPr sz="2400" kern="1200">
+                <a:solidFill>
+                  <a:schemeClr val="tx1"/>
+                </a:solidFill>
+                <a:latin typeface="+mn-lt"/>
+                <a:ea typeface="+mn-ea"/>
+                <a:cs typeface="+mn-cs"/>
+              </a:defRPr>
+            </a:lvl2pPr>
+            <a:lvl3pPr marL="1143000" indent="-228600" algn="l" defTabSz="914400" rtl="0" eaLnBrk="1" latinLnBrk="0" hangingPunct="1">
+              <a:lnSpc>
+                <a:spcPct val="90000"/>
+              </a:lnSpc>
+              <a:spcBef>
+                <a:spcPts val="500"/>
+              </a:spcBef>
+              <a:buFont typeface="Arial" panose="020B0604020202020204" pitchFamily="34" charset="0"/>
+              <a:buChar char="•"/>
+              <a:defRPr sz="2000" kern="1200">
+                <a:solidFill>
+                  <a:schemeClr val="tx1"/>
+                </a:solidFill>
+                <a:latin typeface="+mn-lt"/>
+                <a:ea typeface="+mn-ea"/>
+                <a:cs typeface="+mn-cs"/>
+              </a:defRPr>
+            </a:lvl3pPr>
+            <a:lvl4pPr marL="1600200" indent="-228600" algn="l" defTabSz="914400" rtl="0" eaLnBrk="1" latinLnBrk="0" hangingPunct="1">
+              <a:lnSpc>
+                <a:spcPct val="90000"/>
+              </a:lnSpc>
+              <a:spcBef>
+                <a:spcPts val="500"/>
+              </a:spcBef>
+              <a:buFont typeface="Arial" panose="020B0604020202020204" pitchFamily="34" charset="0"/>
+              <a:buChar char="•"/>
+              <a:defRPr sz="1800" kern="1200">
+                <a:solidFill>
+                  <a:schemeClr val="tx1"/>
+                </a:solidFill>
+                <a:latin typeface="+mn-lt"/>
+                <a:ea typeface="+mn-ea"/>
+                <a:cs typeface="+mn-cs"/>
+              </a:defRPr>
+            </a:lvl4pPr>
+            <a:lvl5pPr marL="2057400" indent="-228600" algn="l" defTabSz="914400" rtl="0" eaLnBrk="1" latinLnBrk="0" hangingPunct="1">
+              <a:lnSpc>
+                <a:spcPct val="90000"/>
+              </a:lnSpc>
+              <a:spcBef>
+                <a:spcPts val="500"/>
+              </a:spcBef>
+              <a:buFont typeface="Arial" panose="020B0604020202020204" pitchFamily="34" charset="0"/>
+              <a:buChar char="•"/>
+              <a:defRPr sz="1800" kern="1200">
+                <a:solidFill>
+                  <a:schemeClr val="tx1"/>
+                </a:solidFill>
+                <a:latin typeface="+mn-lt"/>
+                <a:ea typeface="+mn-ea"/>
+                <a:cs typeface="+mn-cs"/>
+              </a:defRPr>
+            </a:lvl5pPr>
+            <a:lvl6pPr marL="2514600" indent="-228600" algn="l" defTabSz="914400" rtl="0" eaLnBrk="1" latinLnBrk="0" hangingPunct="1">
+              <a:lnSpc>
+                <a:spcPct val="90000"/>
+              </a:lnSpc>
+              <a:spcBef>
+                <a:spcPts val="500"/>
+              </a:spcBef>
+              <a:buFont typeface="Arial" panose="020B0604020202020204" pitchFamily="34" charset="0"/>
+              <a:buChar char="•"/>
+              <a:defRPr sz="1800" kern="1200">
+                <a:solidFill>
+                  <a:schemeClr val="tx1"/>
+                </a:solidFill>
+                <a:latin typeface="+mn-lt"/>
+                <a:ea typeface="+mn-ea"/>
+                <a:cs typeface="+mn-cs"/>
+              </a:defRPr>
+            </a:lvl6pPr>
+            <a:lvl7pPr marL="2971800" indent="-228600" algn="l" defTabSz="914400" rtl="0" eaLnBrk="1" latinLnBrk="0" hangingPunct="1">
+              <a:lnSpc>
+                <a:spcPct val="90000"/>
+              </a:lnSpc>
+              <a:spcBef>
+                <a:spcPts val="500"/>
+              </a:spcBef>
+              <a:buFont typeface="Arial" panose="020B0604020202020204" pitchFamily="34" charset="0"/>
+              <a:buChar char="•"/>
+              <a:defRPr sz="1800" kern="1200">
+                <a:solidFill>
+                  <a:schemeClr val="tx1"/>
+                </a:solidFill>
+                <a:latin typeface="+mn-lt"/>
+                <a:ea typeface="+mn-ea"/>
+                <a:cs typeface="+mn-cs"/>
+              </a:defRPr>
+            </a:lvl7pPr>
+            <a:lvl8pPr marL="3429000" indent="-228600" algn="l" defTabSz="914400" rtl="0" eaLnBrk="1" latinLnBrk="0" hangingPunct="1">
+              <a:lnSpc>
+                <a:spcPct val="90000"/>
+              </a:lnSpc>
+              <a:spcBef>
+                <a:spcPts val="500"/>
+              </a:spcBef>
+              <a:buFont typeface="Arial" panose="020B0604020202020204" pitchFamily="34" charset="0"/>
+              <a:buChar char="•"/>
+              <a:defRPr sz="1800" kern="1200">
+                <a:solidFill>
+                  <a:schemeClr val="tx1"/>
+                </a:solidFill>
+                <a:latin typeface="+mn-lt"/>
+                <a:ea typeface="+mn-ea"/>
+                <a:cs typeface="+mn-cs"/>
+              </a:defRPr>
+            </a:lvl8pPr>
+            <a:lvl9pPr marL="3886200" indent="-228600" algn="l" defTabSz="914400" rtl="0" eaLnBrk="1" latinLnBrk="0" hangingPunct="1">
+              <a:lnSpc>
+                <a:spcPct val="90000"/>
+              </a:lnSpc>
+              <a:spcBef>
+                <a:spcPts val="500"/>
+              </a:spcBef>
+              <a:buFont typeface="Arial" panose="020B0604020202020204" pitchFamily="34" charset="0"/>
+              <a:buChar char="•"/>
+              <a:defRPr sz="1800" kern="1200">
+                <a:solidFill>
+                  <a:schemeClr val="tx1"/>
+                </a:solidFill>
+                <a:latin typeface="+mn-lt"/>
+                <a:ea typeface="+mn-ea"/>
+                <a:cs typeface="+mn-cs"/>
+              </a:defRPr>
+            </a:lvl9pPr>
+          </a:lstStyle>
+          <a:p>
+            <a:r>
+              <a:rPr lang="en-US" dirty="0"/>
+              <a:t>A vocabulary of known words</a:t>
+            </a:r>
+          </a:p>
+          <a:p>
+            <a:r>
+              <a:rPr lang="en-US" dirty="0"/>
+              <a:t>A measure of the presence of known words</a:t>
+            </a:r>
+          </a:p>
+          <a:p>
+            <a:endParaRPr lang="en-US" dirty="0"/>
+          </a:p>
+          <a:p>
+            <a:endParaRPr lang="en-US" dirty="0"/>
+          </a:p>
+        </p:txBody>
+      </p:sp>
       <p:sp>
         <p:nvSpPr>
           <p:cNvPr id="8" name="TextBox 7">
@@ -9882,7 +10618,7 @@
 </p:sld>
 </file>
 
-<file path=ppt/slides/slide17.xml><?xml version="1.0" encoding="utf-8"?>
+<file path=ppt/slides/slide18.xml><?xml version="1.0" encoding="utf-8"?>
 <p:sld xmlns:a="http://schemas.openxmlformats.org/drawingml/2006/main" xmlns:r="http://schemas.openxmlformats.org/officeDocument/2006/relationships" xmlns:p="http://schemas.openxmlformats.org/presentationml/2006/main">
   <p:cSld>
     <p:spTree>
@@ -10420,7 +11156,7 @@
 </p:sld>
 </file>
 
-<file path=ppt/slides/slide18.xml><?xml version="1.0" encoding="utf-8"?>
+<file path=ppt/slides/slide19.xml><?xml version="1.0" encoding="utf-8"?>
 <p:sld xmlns:a="http://schemas.openxmlformats.org/drawingml/2006/main" xmlns:r="http://schemas.openxmlformats.org/officeDocument/2006/relationships" xmlns:p="http://schemas.openxmlformats.org/presentationml/2006/main">
   <p:cSld>
     <p:spTree>
@@ -10952,7 +11688,7 @@
 </p:sld>
 </file>
 
-<file path=ppt/slides/slide19.xml><?xml version="1.0" encoding="utf-8"?>
+<file path=ppt/slides/slide2.xml><?xml version="1.0" encoding="utf-8"?>
 <p:sld xmlns:a="http://schemas.openxmlformats.org/drawingml/2006/main" xmlns:r="http://schemas.openxmlformats.org/officeDocument/2006/relationships" xmlns:p="http://schemas.openxmlformats.org/presentationml/2006/main">
   <p:cSld>
     <p:spTree>
@@ -10974,6 +11710,155 @@
           <p:cNvPr id="2" name="Title 1">
             <a:extLst>
               <a:ext uri="{FF2B5EF4-FFF2-40B4-BE49-F238E27FC236}">
+                <a16:creationId xmlns:a16="http://schemas.microsoft.com/office/drawing/2014/main" id="{8ABFBE79-154E-B642-BFD7-A8715345D559}"/>
+              </a:ext>
+            </a:extLst>
+          </p:cNvPr>
+          <p:cNvSpPr>
+            <a:spLocks noGrp="1"/>
+          </p:cNvSpPr>
+          <p:nvPr>
+            <p:ph type="title"/>
+          </p:nvPr>
+        </p:nvSpPr>
+        <p:spPr/>
+        <p:txBody>
+          <a:bodyPr/>
+          <a:lstStyle/>
+          <a:p>
+            <a:r>
+              <a:rPr lang="en-US" dirty="0"/>
+              <a:t>Homework feedback	</a:t>
+            </a:r>
+          </a:p>
+        </p:txBody>
+      </p:sp>
+      <p:sp>
+        <p:nvSpPr>
+          <p:cNvPr id="3" name="Content Placeholder 2">
+            <a:extLst>
+              <a:ext uri="{FF2B5EF4-FFF2-40B4-BE49-F238E27FC236}">
+                <a16:creationId xmlns:a16="http://schemas.microsoft.com/office/drawing/2014/main" id="{1F48FCEB-FAFA-3841-8898-C6E9877F8C0B}"/>
+              </a:ext>
+            </a:extLst>
+          </p:cNvPr>
+          <p:cNvSpPr>
+            <a:spLocks noGrp="1"/>
+          </p:cNvSpPr>
+          <p:nvPr>
+            <p:ph idx="1"/>
+          </p:nvPr>
+        </p:nvSpPr>
+        <p:spPr/>
+        <p:txBody>
+          <a:bodyPr>
+            <a:normAutofit/>
+          </a:bodyPr>
+          <a:lstStyle/>
+          <a:p>
+            <a:r>
+              <a:rPr lang="en-US" dirty="0"/>
+              <a:t>ALWAYS do preprocessing steps like imputation in a pipeline </a:t>
+            </a:r>
+          </a:p>
+          <a:p>
+            <a:r>
+              <a:rPr lang="en-US" dirty="0"/>
+              <a:t>Otherwise, apply preprocessing steps only on training set not the whole data</a:t>
+            </a:r>
+          </a:p>
+          <a:p>
+            <a:r>
+              <a:rPr lang="en-US" dirty="0"/>
+              <a:t>Normalize data before PCA</a:t>
+            </a:r>
+          </a:p>
+          <a:p>
+            <a:r>
+              <a:rPr lang="en-US" dirty="0"/>
+              <a:t>Import libraries at the top</a:t>
+            </a:r>
+          </a:p>
+          <a:p>
+            <a:r>
+              <a:rPr lang="en-US" dirty="0"/>
+              <a:t>Once stablished n numbers of cluster, run clustering again with that number</a:t>
+            </a:r>
+          </a:p>
+          <a:p>
+            <a:r>
+              <a:rPr lang="en-US" dirty="0"/>
+              <a:t>Feel free to update read me file to reflect your work!</a:t>
+            </a:r>
+          </a:p>
+          <a:p>
+            <a:r>
+              <a:rPr lang="en-US" dirty="0"/>
+              <a:t>Take advantage of Git!</a:t>
+            </a:r>
+          </a:p>
+        </p:txBody>
+      </p:sp>
+      <p:sp>
+        <p:nvSpPr>
+          <p:cNvPr id="4" name="Footer Placeholder 3">
+            <a:extLst>
+              <a:ext uri="{FF2B5EF4-FFF2-40B4-BE49-F238E27FC236}">
+                <a16:creationId xmlns:a16="http://schemas.microsoft.com/office/drawing/2014/main" id="{65B84BCA-C77E-3242-8EEB-290BEB6A1B9A}"/>
+              </a:ext>
+            </a:extLst>
+          </p:cNvPr>
+          <p:cNvSpPr>
+            <a:spLocks noGrp="1"/>
+          </p:cNvSpPr>
+          <p:nvPr>
+            <p:ph type="ftr" sz="quarter" idx="11"/>
+          </p:nvPr>
+        </p:nvSpPr>
+        <p:spPr/>
+        <p:txBody>
+          <a:bodyPr/>
+          <a:lstStyle/>
+          <a:p>
+            <a:endParaRPr lang="en-US"/>
+          </a:p>
+        </p:txBody>
+      </p:sp>
+    </p:spTree>
+    <p:extLst>
+      <p:ext uri="{BB962C8B-B14F-4D97-AF65-F5344CB8AC3E}">
+        <p14:creationId xmlns:p14="http://schemas.microsoft.com/office/powerpoint/2010/main" val="763705661"/>
+      </p:ext>
+    </p:extLst>
+  </p:cSld>
+  <p:clrMapOvr>
+    <a:masterClrMapping/>
+  </p:clrMapOvr>
+</p:sld>
+</file>
+
+<file path=ppt/slides/slide20.xml><?xml version="1.0" encoding="utf-8"?>
+<p:sld xmlns:a="http://schemas.openxmlformats.org/drawingml/2006/main" xmlns:r="http://schemas.openxmlformats.org/officeDocument/2006/relationships" xmlns:p="http://schemas.openxmlformats.org/presentationml/2006/main">
+  <p:cSld>
+    <p:spTree>
+      <p:nvGrpSpPr>
+        <p:cNvPr id="1" name=""/>
+        <p:cNvGrpSpPr/>
+        <p:nvPr/>
+      </p:nvGrpSpPr>
+      <p:grpSpPr>
+        <a:xfrm>
+          <a:off x="0" y="0"/>
+          <a:ext cx="0" cy="0"/>
+          <a:chOff x="0" y="0"/>
+          <a:chExt cx="0" cy="0"/>
+        </a:xfrm>
+      </p:grpSpPr>
+      <p:sp>
+        <p:nvSpPr>
+          <p:cNvPr id="2" name="Title 1">
+            <a:extLst>
+              <a:ext uri="{FF2B5EF4-FFF2-40B4-BE49-F238E27FC236}">
                 <a16:creationId xmlns:a16="http://schemas.microsoft.com/office/drawing/2014/main" id="{DD17E14E-A8FA-0A46-9151-9223A1DA1B6A}"/>
               </a:ext>
             </a:extLst>
@@ -11065,7 +11950,7 @@
 </p:sld>
 </file>
 
-<file path=ppt/slides/slide2.xml><?xml version="1.0" encoding="utf-8"?>
+<file path=ppt/slides/slide3.xml><?xml version="1.0" encoding="utf-8"?>
 <p:sld xmlns:a="http://schemas.openxmlformats.org/drawingml/2006/main" xmlns:r="http://schemas.openxmlformats.org/officeDocument/2006/relationships" xmlns:p="http://schemas.openxmlformats.org/presentationml/2006/main">
   <p:cSld>
     <p:spTree>
@@ -11416,7 +12301,7 @@
 </p:sld>
 </file>
 
-<file path=ppt/slides/slide3.xml><?xml version="1.0" encoding="utf-8"?>
+<file path=ppt/slides/slide4.xml><?xml version="1.0" encoding="utf-8"?>
 <p:sld xmlns:a="http://schemas.openxmlformats.org/drawingml/2006/main" xmlns:r="http://schemas.openxmlformats.org/officeDocument/2006/relationships" xmlns:p="http://schemas.openxmlformats.org/presentationml/2006/main">
   <p:cSld>
     <p:spTree>
@@ -11756,7 +12641,7 @@
 </p:sld>
 </file>
 
-<file path=ppt/slides/slide4.xml><?xml version="1.0" encoding="utf-8"?>
+<file path=ppt/slides/slide5.xml><?xml version="1.0" encoding="utf-8"?>
 <p:sld xmlns:a="http://schemas.openxmlformats.org/drawingml/2006/main" xmlns:r="http://schemas.openxmlformats.org/officeDocument/2006/relationships" xmlns:p="http://schemas.openxmlformats.org/presentationml/2006/main">
   <p:cSld>
     <p:spTree>
@@ -12156,7 +13041,7 @@
 </p:sld>
 </file>
 
-<file path=ppt/slides/slide5.xml><?xml version="1.0" encoding="utf-8"?>
+<file path=ppt/slides/slide6.xml><?xml version="1.0" encoding="utf-8"?>
 <p:sld xmlns:a="http://schemas.openxmlformats.org/drawingml/2006/main" xmlns:r="http://schemas.openxmlformats.org/officeDocument/2006/relationships" xmlns:p="http://schemas.openxmlformats.org/presentationml/2006/main">
   <p:cSld>
     <p:spTree>
@@ -12508,361 +13393,6 @@
     <p:extLst>
       <p:ext uri="{BB962C8B-B14F-4D97-AF65-F5344CB8AC3E}">
         <p14:creationId xmlns:p14="http://schemas.microsoft.com/office/powerpoint/2010/main" val="1822582266"/>
-      </p:ext>
-    </p:extLst>
-  </p:cSld>
-  <p:clrMapOvr>
-    <a:masterClrMapping/>
-  </p:clrMapOvr>
-</p:sld>
-</file>
-
-<file path=ppt/slides/slide6.xml><?xml version="1.0" encoding="utf-8"?>
-<p:sld xmlns:a="http://schemas.openxmlformats.org/drawingml/2006/main" xmlns:r="http://schemas.openxmlformats.org/officeDocument/2006/relationships" xmlns:p="http://schemas.openxmlformats.org/presentationml/2006/main">
-  <p:cSld>
-    <p:spTree>
-      <p:nvGrpSpPr>
-        <p:cNvPr id="1" name=""/>
-        <p:cNvGrpSpPr/>
-        <p:nvPr/>
-      </p:nvGrpSpPr>
-      <p:grpSpPr>
-        <a:xfrm>
-          <a:off x="0" y="0"/>
-          <a:ext cx="0" cy="0"/>
-          <a:chOff x="0" y="0"/>
-          <a:chExt cx="0" cy="0"/>
-        </a:xfrm>
-      </p:grpSpPr>
-      <p:sp>
-        <p:nvSpPr>
-          <p:cNvPr id="2" name="Title 1">
-            <a:extLst>
-              <a:ext uri="{FF2B5EF4-FFF2-40B4-BE49-F238E27FC236}">
-                <a16:creationId xmlns:a16="http://schemas.microsoft.com/office/drawing/2014/main" id="{E8CE72FC-A0E8-974A-9B4E-6CCA77EDC43A}"/>
-              </a:ext>
-            </a:extLst>
-          </p:cNvPr>
-          <p:cNvSpPr>
-            <a:spLocks noGrp="1"/>
-          </p:cNvSpPr>
-          <p:nvPr>
-            <p:ph type="title"/>
-          </p:nvPr>
-        </p:nvSpPr>
-        <p:spPr/>
-        <p:txBody>
-          <a:bodyPr/>
-          <a:lstStyle/>
-          <a:p>
-            <a:r>
-              <a:rPr lang="en-US" dirty="0"/>
-              <a:t>Preprocessing vs Feature Engineering</a:t>
-            </a:r>
-          </a:p>
-        </p:txBody>
-      </p:sp>
-      <p:sp>
-        <p:nvSpPr>
-          <p:cNvPr id="3" name="Content Placeholder 2">
-            <a:extLst>
-              <a:ext uri="{FF2B5EF4-FFF2-40B4-BE49-F238E27FC236}">
-                <a16:creationId xmlns:a16="http://schemas.microsoft.com/office/drawing/2014/main" id="{68C14E55-D951-A94D-B24A-B5DB71C6A513}"/>
-              </a:ext>
-            </a:extLst>
-          </p:cNvPr>
-          <p:cNvSpPr>
-            <a:spLocks noGrp="1"/>
-          </p:cNvSpPr>
-          <p:nvPr>
-            <p:ph idx="1"/>
-          </p:nvPr>
-        </p:nvSpPr>
-        <p:spPr/>
-        <p:txBody>
-          <a:bodyPr/>
-          <a:lstStyle/>
-          <a:p>
-            <a:endParaRPr lang="en-US" dirty="0"/>
-          </a:p>
-          <a:p>
-            <a:endParaRPr lang="en-US" dirty="0"/>
-          </a:p>
-        </p:txBody>
-      </p:sp>
-      <p:sp>
-        <p:nvSpPr>
-          <p:cNvPr id="4" name="Footer Placeholder 3">
-            <a:extLst>
-              <a:ext uri="{FF2B5EF4-FFF2-40B4-BE49-F238E27FC236}">
-                <a16:creationId xmlns:a16="http://schemas.microsoft.com/office/drawing/2014/main" id="{93DEADD6-0570-A44F-8ECB-1BA4A9AAEF2D}"/>
-              </a:ext>
-            </a:extLst>
-          </p:cNvPr>
-          <p:cNvSpPr>
-            <a:spLocks noGrp="1"/>
-          </p:cNvSpPr>
-          <p:nvPr>
-            <p:ph type="ftr" sz="quarter" idx="11"/>
-          </p:nvPr>
-        </p:nvSpPr>
-        <p:spPr/>
-        <p:txBody>
-          <a:bodyPr/>
-          <a:lstStyle/>
-          <a:p>
-            <a:endParaRPr lang="en-US"/>
-          </a:p>
-        </p:txBody>
-      </p:sp>
-      <p:sp>
-        <p:nvSpPr>
-          <p:cNvPr id="5" name="Content Placeholder 2">
-            <a:extLst>
-              <a:ext uri="{FF2B5EF4-FFF2-40B4-BE49-F238E27FC236}">
-                <a16:creationId xmlns:a16="http://schemas.microsoft.com/office/drawing/2014/main" id="{95511CA2-B533-484B-BB6D-BD44FEB692DB}"/>
-              </a:ext>
-            </a:extLst>
-          </p:cNvPr>
-          <p:cNvSpPr txBox="1">
-            <a:spLocks/>
-          </p:cNvSpPr>
-          <p:nvPr/>
-        </p:nvSpPr>
-        <p:spPr>
-          <a:xfrm>
-            <a:off x="990600" y="1572937"/>
-            <a:ext cx="10515600" cy="4351338"/>
-          </a:xfrm>
-          <a:prstGeom prst="rect">
-            <a:avLst/>
-          </a:prstGeom>
-        </p:spPr>
-        <p:txBody>
-          <a:bodyPr vert="horz" lIns="91440" tIns="45720" rIns="91440" bIns="45720" rtlCol="0">
-            <a:normAutofit/>
-          </a:bodyPr>
-          <a:lstStyle>
-            <a:lvl1pPr marL="228600" indent="-228600" algn="l" defTabSz="914400" rtl="0" eaLnBrk="1" latinLnBrk="0" hangingPunct="1">
-              <a:lnSpc>
-                <a:spcPct val="90000"/>
-              </a:lnSpc>
-              <a:spcBef>
-                <a:spcPts val="1000"/>
-              </a:spcBef>
-              <a:buFont typeface="Arial" panose="020B0604020202020204" pitchFamily="34" charset="0"/>
-              <a:buChar char="•"/>
-              <a:defRPr sz="2800" kern="1200">
-                <a:solidFill>
-                  <a:schemeClr val="tx1"/>
-                </a:solidFill>
-                <a:latin typeface="+mn-lt"/>
-                <a:ea typeface="+mn-ea"/>
-                <a:cs typeface="+mn-cs"/>
-              </a:defRPr>
-            </a:lvl1pPr>
-            <a:lvl2pPr marL="685800" indent="-228600" algn="l" defTabSz="914400" rtl="0" eaLnBrk="1" latinLnBrk="0" hangingPunct="1">
-              <a:lnSpc>
-                <a:spcPct val="90000"/>
-              </a:lnSpc>
-              <a:spcBef>
-                <a:spcPts val="500"/>
-              </a:spcBef>
-              <a:buFont typeface="Arial" panose="020B0604020202020204" pitchFamily="34" charset="0"/>
-              <a:buChar char="•"/>
-              <a:defRPr sz="2400" kern="1200">
-                <a:solidFill>
-                  <a:schemeClr val="tx1"/>
-                </a:solidFill>
-                <a:latin typeface="+mn-lt"/>
-                <a:ea typeface="+mn-ea"/>
-                <a:cs typeface="+mn-cs"/>
-              </a:defRPr>
-            </a:lvl2pPr>
-            <a:lvl3pPr marL="1143000" indent="-228600" algn="l" defTabSz="914400" rtl="0" eaLnBrk="1" latinLnBrk="0" hangingPunct="1">
-              <a:lnSpc>
-                <a:spcPct val="90000"/>
-              </a:lnSpc>
-              <a:spcBef>
-                <a:spcPts val="500"/>
-              </a:spcBef>
-              <a:buFont typeface="Arial" panose="020B0604020202020204" pitchFamily="34" charset="0"/>
-              <a:buChar char="•"/>
-              <a:defRPr sz="2000" kern="1200">
-                <a:solidFill>
-                  <a:schemeClr val="tx1"/>
-                </a:solidFill>
-                <a:latin typeface="+mn-lt"/>
-                <a:ea typeface="+mn-ea"/>
-                <a:cs typeface="+mn-cs"/>
-              </a:defRPr>
-            </a:lvl3pPr>
-            <a:lvl4pPr marL="1600200" indent="-228600" algn="l" defTabSz="914400" rtl="0" eaLnBrk="1" latinLnBrk="0" hangingPunct="1">
-              <a:lnSpc>
-                <a:spcPct val="90000"/>
-              </a:lnSpc>
-              <a:spcBef>
-                <a:spcPts val="500"/>
-              </a:spcBef>
-              <a:buFont typeface="Arial" panose="020B0604020202020204" pitchFamily="34" charset="0"/>
-              <a:buChar char="•"/>
-              <a:defRPr sz="1800" kern="1200">
-                <a:solidFill>
-                  <a:schemeClr val="tx1"/>
-                </a:solidFill>
-                <a:latin typeface="+mn-lt"/>
-                <a:ea typeface="+mn-ea"/>
-                <a:cs typeface="+mn-cs"/>
-              </a:defRPr>
-            </a:lvl4pPr>
-            <a:lvl5pPr marL="2057400" indent="-228600" algn="l" defTabSz="914400" rtl="0" eaLnBrk="1" latinLnBrk="0" hangingPunct="1">
-              <a:lnSpc>
-                <a:spcPct val="90000"/>
-              </a:lnSpc>
-              <a:spcBef>
-                <a:spcPts val="500"/>
-              </a:spcBef>
-              <a:buFont typeface="Arial" panose="020B0604020202020204" pitchFamily="34" charset="0"/>
-              <a:buChar char="•"/>
-              <a:defRPr sz="1800" kern="1200">
-                <a:solidFill>
-                  <a:schemeClr val="tx1"/>
-                </a:solidFill>
-                <a:latin typeface="+mn-lt"/>
-                <a:ea typeface="+mn-ea"/>
-                <a:cs typeface="+mn-cs"/>
-              </a:defRPr>
-            </a:lvl5pPr>
-            <a:lvl6pPr marL="2514600" indent="-228600" algn="l" defTabSz="914400" rtl="0" eaLnBrk="1" latinLnBrk="0" hangingPunct="1">
-              <a:lnSpc>
-                <a:spcPct val="90000"/>
-              </a:lnSpc>
-              <a:spcBef>
-                <a:spcPts val="500"/>
-              </a:spcBef>
-              <a:buFont typeface="Arial" panose="020B0604020202020204" pitchFamily="34" charset="0"/>
-              <a:buChar char="•"/>
-              <a:defRPr sz="1800" kern="1200">
-                <a:solidFill>
-                  <a:schemeClr val="tx1"/>
-                </a:solidFill>
-                <a:latin typeface="+mn-lt"/>
-                <a:ea typeface="+mn-ea"/>
-                <a:cs typeface="+mn-cs"/>
-              </a:defRPr>
-            </a:lvl6pPr>
-            <a:lvl7pPr marL="2971800" indent="-228600" algn="l" defTabSz="914400" rtl="0" eaLnBrk="1" latinLnBrk="0" hangingPunct="1">
-              <a:lnSpc>
-                <a:spcPct val="90000"/>
-              </a:lnSpc>
-              <a:spcBef>
-                <a:spcPts val="500"/>
-              </a:spcBef>
-              <a:buFont typeface="Arial" panose="020B0604020202020204" pitchFamily="34" charset="0"/>
-              <a:buChar char="•"/>
-              <a:defRPr sz="1800" kern="1200">
-                <a:solidFill>
-                  <a:schemeClr val="tx1"/>
-                </a:solidFill>
-                <a:latin typeface="+mn-lt"/>
-                <a:ea typeface="+mn-ea"/>
-                <a:cs typeface="+mn-cs"/>
-              </a:defRPr>
-            </a:lvl7pPr>
-            <a:lvl8pPr marL="3429000" indent="-228600" algn="l" defTabSz="914400" rtl="0" eaLnBrk="1" latinLnBrk="0" hangingPunct="1">
-              <a:lnSpc>
-                <a:spcPct val="90000"/>
-              </a:lnSpc>
-              <a:spcBef>
-                <a:spcPts val="500"/>
-              </a:spcBef>
-              <a:buFont typeface="Arial" panose="020B0604020202020204" pitchFamily="34" charset="0"/>
-              <a:buChar char="•"/>
-              <a:defRPr sz="1800" kern="1200">
-                <a:solidFill>
-                  <a:schemeClr val="tx1"/>
-                </a:solidFill>
-                <a:latin typeface="+mn-lt"/>
-                <a:ea typeface="+mn-ea"/>
-                <a:cs typeface="+mn-cs"/>
-              </a:defRPr>
-            </a:lvl8pPr>
-            <a:lvl9pPr marL="3886200" indent="-228600" algn="l" defTabSz="914400" rtl="0" eaLnBrk="1" latinLnBrk="0" hangingPunct="1">
-              <a:lnSpc>
-                <a:spcPct val="90000"/>
-              </a:lnSpc>
-              <a:spcBef>
-                <a:spcPts val="500"/>
-              </a:spcBef>
-              <a:buFont typeface="Arial" panose="020B0604020202020204" pitchFamily="34" charset="0"/>
-              <a:buChar char="•"/>
-              <a:defRPr sz="1800" kern="1200">
-                <a:solidFill>
-                  <a:schemeClr val="tx1"/>
-                </a:solidFill>
-                <a:latin typeface="+mn-lt"/>
-                <a:ea typeface="+mn-ea"/>
-                <a:cs typeface="+mn-cs"/>
-              </a:defRPr>
-            </a:lvl9pPr>
-          </a:lstStyle>
-          <a:p>
-            <a:r>
-              <a:rPr lang="en-US" dirty="0"/>
-              <a:t>Initial data collection</a:t>
-            </a:r>
-          </a:p>
-          <a:p>
-            <a:r>
-              <a:rPr lang="en-US" dirty="0"/>
-              <a:t>Creating the target variable</a:t>
-            </a:r>
-          </a:p>
-          <a:p>
-            <a:r>
-              <a:rPr lang="en-US" dirty="0"/>
-              <a:t>De-duplicating, imputation, fixing mislabeled classes, other data cleaning</a:t>
-            </a:r>
-          </a:p>
-          <a:p>
-            <a:r>
-              <a:rPr lang="en-US" dirty="0"/>
-              <a:t>Scaling or normalization</a:t>
-            </a:r>
-          </a:p>
-          <a:p>
-            <a:r>
-              <a:rPr lang="en-US" dirty="0"/>
-              <a:t>Feature selection</a:t>
-            </a:r>
-          </a:p>
-          <a:p>
-            <a:endParaRPr lang="en-US" dirty="0"/>
-          </a:p>
-          <a:p>
-            <a:pPr marL="0" indent="0" algn="ctr">
-              <a:buNone/>
-            </a:pPr>
-            <a:r>
-              <a:rPr lang="en-US" b="1" dirty="0"/>
-              <a:t>These are NOT feature engineering!</a:t>
-            </a:r>
-          </a:p>
-          <a:p>
-            <a:pPr marL="0" indent="0">
-              <a:buNone/>
-            </a:pPr>
-            <a:endParaRPr lang="en-US" dirty="0"/>
-          </a:p>
-          <a:p>
-            <a:endParaRPr lang="en-US" dirty="0"/>
-          </a:p>
-        </p:txBody>
-      </p:sp>
-    </p:spTree>
-    <p:extLst>
-      <p:ext uri="{BB962C8B-B14F-4D97-AF65-F5344CB8AC3E}">
-        <p14:creationId xmlns:p14="http://schemas.microsoft.com/office/powerpoint/2010/main" val="1716833592"/>
       </p:ext>
     </p:extLst>
   </p:cSld>
@@ -12912,7 +13442,7 @@
           <a:p>
             <a:r>
               <a:rPr lang="en-US" dirty="0"/>
-              <a:t>Feature Engineering Techniques</a:t>
+              <a:t>Preprocessing vs Feature Engineering</a:t>
             </a:r>
           </a:p>
         </p:txBody>
@@ -12941,36 +13471,6 @@
             <a:endParaRPr lang="en-US" dirty="0"/>
           </a:p>
           <a:p>
-            <a:endParaRPr lang="en-US" dirty="0"/>
-          </a:p>
-          <a:p>
-            <a:r>
-              <a:rPr lang="en-US" dirty="0"/>
-              <a:t>Target transformation</a:t>
-            </a:r>
-          </a:p>
-          <a:p>
-            <a:r>
-              <a:rPr lang="en-US" dirty="0"/>
-              <a:t>Feature Encoding</a:t>
-            </a:r>
-          </a:p>
-          <a:p>
-            <a:r>
-              <a:rPr lang="en-US" dirty="0"/>
-              <a:t>Feature Extraction</a:t>
-            </a:r>
-          </a:p>
-          <a:p>
-            <a:r>
-              <a:rPr lang="en-US" dirty="0"/>
-              <a:t>Remove irrelevant or noisy features</a:t>
-            </a:r>
-          </a:p>
-          <a:p>
-            <a:pPr marL="0" indent="0">
-              <a:buNone/>
-            </a:pPr>
             <a:endParaRPr lang="en-US" dirty="0"/>
           </a:p>
         </p:txBody>
@@ -13192,6 +13692,54 @@
             </a:lvl9pPr>
           </a:lstStyle>
           <a:p>
+            <a:r>
+              <a:rPr lang="en-US" dirty="0"/>
+              <a:t>Initial data collection</a:t>
+            </a:r>
+          </a:p>
+          <a:p>
+            <a:r>
+              <a:rPr lang="en-US" dirty="0"/>
+              <a:t>Creating the target variable</a:t>
+            </a:r>
+          </a:p>
+          <a:p>
+            <a:r>
+              <a:rPr lang="en-US" dirty="0"/>
+              <a:t>De-duplicating, imputation, fixing mislabeled classes, other data cleaning</a:t>
+            </a:r>
+          </a:p>
+          <a:p>
+            <a:r>
+              <a:rPr lang="en-US" dirty="0"/>
+              <a:t>Scaling or normalization</a:t>
+            </a:r>
+          </a:p>
+          <a:p>
+            <a:r>
+              <a:rPr lang="en-US" dirty="0"/>
+              <a:t>Feature selection</a:t>
+            </a:r>
+          </a:p>
+          <a:p>
+            <a:endParaRPr lang="en-US" dirty="0"/>
+          </a:p>
+          <a:p>
+            <a:pPr marL="0" indent="0" algn="ctr">
+              <a:buNone/>
+            </a:pPr>
+            <a:r>
+              <a:rPr lang="en-US" b="1" dirty="0"/>
+              <a:t>These are NOT feature engineering!</a:t>
+            </a:r>
+          </a:p>
+          <a:p>
+            <a:pPr marL="0" indent="0">
+              <a:buNone/>
+            </a:pPr>
+            <a:endParaRPr lang="en-US" dirty="0"/>
+          </a:p>
+          <a:p>
             <a:endParaRPr lang="en-US" dirty="0"/>
           </a:p>
         </p:txBody>
@@ -13199,7 +13747,7 @@
     </p:spTree>
     <p:extLst>
       <p:ext uri="{BB962C8B-B14F-4D97-AF65-F5344CB8AC3E}">
-        <p14:creationId xmlns:p14="http://schemas.microsoft.com/office/powerpoint/2010/main" val="3571445128"/>
+        <p14:creationId xmlns:p14="http://schemas.microsoft.com/office/powerpoint/2010/main" val="1716833592"/>
       </p:ext>
     </p:extLst>
   </p:cSld>
@@ -13272,129 +13820,36 @@
         </p:nvSpPr>
         <p:spPr/>
         <p:txBody>
-          <a:bodyPr>
-            <a:normAutofit/>
-          </a:bodyPr>
+          <a:bodyPr/>
           <a:lstStyle/>
           <a:p>
-            <a:pPr marL="0" indent="0">
-              <a:buNone/>
-            </a:pPr>
+            <a:endParaRPr lang="en-US" dirty="0"/>
+          </a:p>
+          <a:p>
+            <a:endParaRPr lang="en-US" dirty="0"/>
+          </a:p>
+          <a:p>
             <a:r>
               <a:rPr lang="en-US" dirty="0"/>
-              <a:t>Extract new features, remove noisy or irrelevant data through:</a:t>
-            </a:r>
-          </a:p>
-          <a:p>
-            <a:pPr marL="0" indent="0">
-              <a:buNone/>
-            </a:pPr>
-            <a:endParaRPr lang="en-US" dirty="0"/>
-          </a:p>
-          <a:p>
-            <a:r>
-              <a:rPr lang="en-US" b="1" dirty="0"/>
-              <a:t>Feature Selection</a:t>
-            </a:r>
-          </a:p>
-          <a:p>
-            <a:r>
-              <a:rPr lang="en-US" b="1" dirty="0"/>
-              <a:t>Target/Feature Transformation</a:t>
-            </a:r>
+              <a:t>Target transformation</a:t>
+            </a:r>
+          </a:p>
+          <a:p>
             <a:r>
               <a:rPr lang="en-US" dirty="0"/>
-              <a:t>. Examples: log(x), sqrt(x)</a:t>
-            </a:r>
-          </a:p>
-          <a:p>
-            <a:r>
-              <a:rPr lang="en-US" b="1" dirty="0"/>
-              <a:t>Feature Encoding. </a:t>
-            </a:r>
+              <a:t>Feature Encoding</a:t>
+            </a:r>
+          </a:p>
+          <a:p>
             <a:r>
               <a:rPr lang="en-US" dirty="0"/>
-              <a:t>i.e. turn categorical features into numeric features</a:t>
-            </a:r>
-          </a:p>
-          <a:p>
-            <a:pPr lvl="1"/>
-            <a:r>
-              <a:rPr lang="en-US" dirty="0" err="1"/>
-              <a:t>Sklearn</a:t>
-            </a:r>
+              <a:t>Feature Extraction</a:t>
+            </a:r>
+          </a:p>
+          <a:p>
             <a:r>
               <a:rPr lang="en-US" dirty="0"/>
-              <a:t> examples: </a:t>
-            </a:r>
-            <a:r>
-              <a:rPr lang="en-US" dirty="0" err="1"/>
-              <a:t>LabelEncoder</a:t>
-            </a:r>
-            <a:r>
-              <a:rPr lang="en-US" dirty="0"/>
-              <a:t>() (for tree models), </a:t>
-            </a:r>
-            <a:r>
-              <a:rPr lang="en-US" dirty="0" err="1"/>
-              <a:t>OneHotEncoder</a:t>
-            </a:r>
-            <a:r>
-              <a:rPr lang="en-US" dirty="0"/>
-              <a:t>() </a:t>
-            </a:r>
-          </a:p>
-          <a:p>
-            <a:r>
-              <a:rPr lang="en-US" b="1" dirty="0"/>
-              <a:t>Feature Interaction. </a:t>
-            </a:r>
-            <a:r>
-              <a:rPr lang="en-US" dirty="0"/>
-              <a:t>Examples</a:t>
-            </a:r>
-            <a:r>
-              <a:rPr lang="en-US" b="1" dirty="0"/>
-              <a:t>: </a:t>
-            </a:r>
-            <a:r>
-              <a:rPr lang="en-US" dirty="0"/>
-              <a:t>X</a:t>
-            </a:r>
-            <a:r>
-              <a:rPr lang="en-US" baseline="-25000" dirty="0"/>
-              <a:t>1</a:t>
-            </a:r>
-            <a:r>
-              <a:rPr lang="en-US" dirty="0"/>
-              <a:t> + X</a:t>
-            </a:r>
-            <a:r>
-              <a:rPr lang="en-US" baseline="-25000" dirty="0"/>
-              <a:t>2</a:t>
-            </a:r>
-            <a:r>
-              <a:rPr lang="en-US" dirty="0"/>
-              <a:t>, X</a:t>
-            </a:r>
-            <a:r>
-              <a:rPr lang="en-US" baseline="-25000" dirty="0"/>
-              <a:t>1</a:t>
-            </a:r>
-            <a:r>
-              <a:rPr lang="en-US" baseline="30000" dirty="0"/>
-              <a:t>2</a:t>
-            </a:r>
-            <a:endParaRPr lang="en-US" b="1" baseline="30000" dirty="0"/>
-          </a:p>
-          <a:p>
-            <a:r>
-              <a:rPr lang="en-US" b="1" dirty="0"/>
-              <a:t>Feature Extraction. </a:t>
-            </a:r>
-            <a:r>
-              <a:rPr lang="en-US" dirty="0"/>
-              <a:t>Examples: Time, Location</a:t>
+              <a:t>Remove irrelevant or noisy features</a:t>
             </a:r>
           </a:p>
           <a:p>
@@ -13629,7 +14084,7 @@
     </p:spTree>
     <p:extLst>
       <p:ext uri="{BB962C8B-B14F-4D97-AF65-F5344CB8AC3E}">
-        <p14:creationId xmlns:p14="http://schemas.microsoft.com/office/powerpoint/2010/main" val="1245804402"/>
+        <p14:creationId xmlns:p14="http://schemas.microsoft.com/office/powerpoint/2010/main" val="3571445128"/>
       </p:ext>
     </p:extLst>
   </p:cSld>
@@ -13679,8 +14134,159 @@
           <a:p>
             <a:r>
               <a:rPr lang="en-US" dirty="0"/>
+              <a:t>Feature Engineering Techniques</a:t>
+            </a:r>
+          </a:p>
+        </p:txBody>
+      </p:sp>
+      <p:sp>
+        <p:nvSpPr>
+          <p:cNvPr id="3" name="Content Placeholder 2">
+            <a:extLst>
+              <a:ext uri="{FF2B5EF4-FFF2-40B4-BE49-F238E27FC236}">
+                <a16:creationId xmlns:a16="http://schemas.microsoft.com/office/drawing/2014/main" id="{68C14E55-D951-A94D-B24A-B5DB71C6A513}"/>
+              </a:ext>
+            </a:extLst>
+          </p:cNvPr>
+          <p:cNvSpPr>
+            <a:spLocks noGrp="1"/>
+          </p:cNvSpPr>
+          <p:nvPr>
+            <p:ph idx="1"/>
+          </p:nvPr>
+        </p:nvSpPr>
+        <p:spPr/>
+        <p:txBody>
+          <a:bodyPr>
+            <a:normAutofit/>
+          </a:bodyPr>
+          <a:lstStyle/>
+          <a:p>
+            <a:pPr marL="0" indent="0">
+              <a:buNone/>
+            </a:pPr>
+            <a:r>
+              <a:rPr lang="en-US" dirty="0"/>
+              <a:t>Extract new features, remove noisy or irrelevant data through:</a:t>
+            </a:r>
+          </a:p>
+          <a:p>
+            <a:pPr marL="0" indent="0">
+              <a:buNone/>
+            </a:pPr>
+            <a:endParaRPr lang="en-US" dirty="0"/>
+          </a:p>
+          <a:p>
+            <a:r>
+              <a:rPr lang="en-US" b="1" dirty="0"/>
               <a:t>Feature Selection</a:t>
             </a:r>
+          </a:p>
+          <a:p>
+            <a:r>
+              <a:rPr lang="en-US" b="1" dirty="0"/>
+              <a:t>Target/Feature Transformation</a:t>
+            </a:r>
+            <a:r>
+              <a:rPr lang="en-US" dirty="0"/>
+              <a:t>. Examples: log(x), sqrt(x)</a:t>
+            </a:r>
+          </a:p>
+          <a:p>
+            <a:r>
+              <a:rPr lang="en-US" b="1" dirty="0"/>
+              <a:t>Feature Encoding. </a:t>
+            </a:r>
+            <a:r>
+              <a:rPr lang="en-US" dirty="0"/>
+              <a:t>i.e. turn categorical features into numeric features</a:t>
+            </a:r>
+          </a:p>
+          <a:p>
+            <a:pPr lvl="1"/>
+            <a:r>
+              <a:rPr lang="en-US" dirty="0" err="1"/>
+              <a:t>Sklearn</a:t>
+            </a:r>
+            <a:r>
+              <a:rPr lang="en-US" dirty="0"/>
+              <a:t> examples: </a:t>
+            </a:r>
+            <a:r>
+              <a:rPr lang="en-US" dirty="0" err="1"/>
+              <a:t>LabelEncoder</a:t>
+            </a:r>
+            <a:r>
+              <a:rPr lang="en-US" dirty="0"/>
+              <a:t>() (for tree models), </a:t>
+            </a:r>
+            <a:r>
+              <a:rPr lang="en-US" dirty="0" err="1"/>
+              <a:t>OneHotEncoder</a:t>
+            </a:r>
+            <a:r>
+              <a:rPr lang="en-US" dirty="0"/>
+              <a:t>() </a:t>
+            </a:r>
+          </a:p>
+          <a:p>
+            <a:r>
+              <a:rPr lang="en-US" b="1" dirty="0"/>
+              <a:t>Feature Interaction. </a:t>
+            </a:r>
+            <a:r>
+              <a:rPr lang="en-US" dirty="0"/>
+              <a:t>Examples</a:t>
+            </a:r>
+            <a:r>
+              <a:rPr lang="en-US" b="1" dirty="0"/>
+              <a:t>: </a:t>
+            </a:r>
+            <a:r>
+              <a:rPr lang="en-US" dirty="0"/>
+              <a:t>X</a:t>
+            </a:r>
+            <a:r>
+              <a:rPr lang="en-US" baseline="-25000" dirty="0"/>
+              <a:t>1</a:t>
+            </a:r>
+            <a:r>
+              <a:rPr lang="en-US" dirty="0"/>
+              <a:t> + X</a:t>
+            </a:r>
+            <a:r>
+              <a:rPr lang="en-US" baseline="-25000" dirty="0"/>
+              <a:t>2</a:t>
+            </a:r>
+            <a:r>
+              <a:rPr lang="en-US" dirty="0"/>
+              <a:t>, X</a:t>
+            </a:r>
+            <a:r>
+              <a:rPr lang="en-US" baseline="-25000" dirty="0"/>
+              <a:t>1</a:t>
+            </a:r>
+            <a:r>
+              <a:rPr lang="en-US" baseline="30000" dirty="0"/>
+              <a:t>2</a:t>
+            </a:r>
+            <a:endParaRPr lang="en-US" b="1" baseline="30000" dirty="0"/>
+          </a:p>
+          <a:p>
+            <a:r>
+              <a:rPr lang="en-US" b="1" dirty="0"/>
+              <a:t>Feature Extraction. </a:t>
+            </a:r>
+            <a:r>
+              <a:rPr lang="en-US" dirty="0"/>
+              <a:t>Examples: Time, Location</a:t>
+            </a:r>
+          </a:p>
+          <a:p>
+            <a:pPr marL="0" indent="0">
+              <a:buNone/>
+            </a:pPr>
+            <a:endParaRPr lang="en-US" dirty="0"/>
           </a:p>
         </p:txBody>
       </p:sp>
@@ -13905,466 +14511,10 @@
           </a:p>
         </p:txBody>
       </p:sp>
-      <p:sp>
-        <p:nvSpPr>
-          <p:cNvPr id="6" name="Content Placeholder 5">
-            <a:extLst>
-              <a:ext uri="{FF2B5EF4-FFF2-40B4-BE49-F238E27FC236}">
-                <a16:creationId xmlns:a16="http://schemas.microsoft.com/office/drawing/2014/main" id="{95B6F104-6E2B-C945-8C45-CFBA33305A08}"/>
-              </a:ext>
-            </a:extLst>
-          </p:cNvPr>
-          <p:cNvSpPr>
-            <a:spLocks noGrp="1"/>
-          </p:cNvSpPr>
-          <p:nvPr>
-            <p:ph idx="1"/>
-          </p:nvPr>
-        </p:nvSpPr>
-        <p:spPr/>
-        <p:txBody>
-          <a:bodyPr/>
-          <a:lstStyle/>
-          <a:p>
-            <a:endParaRPr lang="en-US" dirty="0"/>
-          </a:p>
-          <a:p>
-            <a:endParaRPr lang="en-US" dirty="0"/>
-          </a:p>
-        </p:txBody>
-      </p:sp>
-      <p:sp>
-        <p:nvSpPr>
-          <p:cNvPr id="9" name="Content Placeholder 5">
-            <a:extLst>
-              <a:ext uri="{FF2B5EF4-FFF2-40B4-BE49-F238E27FC236}">
-                <a16:creationId xmlns:a16="http://schemas.microsoft.com/office/drawing/2014/main" id="{713889B6-F6CF-4E46-8347-9663F67039C9}"/>
-              </a:ext>
-            </a:extLst>
-          </p:cNvPr>
-          <p:cNvSpPr txBox="1">
-            <a:spLocks/>
-          </p:cNvSpPr>
-          <p:nvPr/>
-        </p:nvSpPr>
-        <p:spPr>
-          <a:xfrm>
-            <a:off x="990600" y="1978025"/>
-            <a:ext cx="10515600" cy="4351338"/>
-          </a:xfrm>
-          <a:prstGeom prst="rect">
-            <a:avLst/>
-          </a:prstGeom>
-        </p:spPr>
-        <p:txBody>
-          <a:bodyPr vert="horz" lIns="91440" tIns="45720" rIns="91440" bIns="45720" rtlCol="0">
-            <a:normAutofit/>
-          </a:bodyPr>
-          <a:lstStyle>
-            <a:lvl1pPr marL="228600" indent="-228600" algn="l" defTabSz="914400" rtl="0" eaLnBrk="1" latinLnBrk="0" hangingPunct="1">
-              <a:lnSpc>
-                <a:spcPct val="90000"/>
-              </a:lnSpc>
-              <a:spcBef>
-                <a:spcPts val="1000"/>
-              </a:spcBef>
-              <a:buFont typeface="Arial" panose="020B0604020202020204" pitchFamily="34" charset="0"/>
-              <a:buChar char="•"/>
-              <a:defRPr sz="2800" kern="1200">
-                <a:solidFill>
-                  <a:schemeClr val="tx1"/>
-                </a:solidFill>
-                <a:latin typeface="+mn-lt"/>
-                <a:ea typeface="+mn-ea"/>
-                <a:cs typeface="+mn-cs"/>
-              </a:defRPr>
-            </a:lvl1pPr>
-            <a:lvl2pPr marL="685800" indent="-228600" algn="l" defTabSz="914400" rtl="0" eaLnBrk="1" latinLnBrk="0" hangingPunct="1">
-              <a:lnSpc>
-                <a:spcPct val="90000"/>
-              </a:lnSpc>
-              <a:spcBef>
-                <a:spcPts val="500"/>
-              </a:spcBef>
-              <a:buFont typeface="Arial" panose="020B0604020202020204" pitchFamily="34" charset="0"/>
-              <a:buChar char="•"/>
-              <a:defRPr sz="2400" kern="1200">
-                <a:solidFill>
-                  <a:schemeClr val="tx1"/>
-                </a:solidFill>
-                <a:latin typeface="+mn-lt"/>
-                <a:ea typeface="+mn-ea"/>
-                <a:cs typeface="+mn-cs"/>
-              </a:defRPr>
-            </a:lvl2pPr>
-            <a:lvl3pPr marL="1143000" indent="-228600" algn="l" defTabSz="914400" rtl="0" eaLnBrk="1" latinLnBrk="0" hangingPunct="1">
-              <a:lnSpc>
-                <a:spcPct val="90000"/>
-              </a:lnSpc>
-              <a:spcBef>
-                <a:spcPts val="500"/>
-              </a:spcBef>
-              <a:buFont typeface="Arial" panose="020B0604020202020204" pitchFamily="34" charset="0"/>
-              <a:buChar char="•"/>
-              <a:defRPr sz="2000" kern="1200">
-                <a:solidFill>
-                  <a:schemeClr val="tx1"/>
-                </a:solidFill>
-                <a:latin typeface="+mn-lt"/>
-                <a:ea typeface="+mn-ea"/>
-                <a:cs typeface="+mn-cs"/>
-              </a:defRPr>
-            </a:lvl3pPr>
-            <a:lvl4pPr marL="1600200" indent="-228600" algn="l" defTabSz="914400" rtl="0" eaLnBrk="1" latinLnBrk="0" hangingPunct="1">
-              <a:lnSpc>
-                <a:spcPct val="90000"/>
-              </a:lnSpc>
-              <a:spcBef>
-                <a:spcPts val="500"/>
-              </a:spcBef>
-              <a:buFont typeface="Arial" panose="020B0604020202020204" pitchFamily="34" charset="0"/>
-              <a:buChar char="•"/>
-              <a:defRPr sz="1800" kern="1200">
-                <a:solidFill>
-                  <a:schemeClr val="tx1"/>
-                </a:solidFill>
-                <a:latin typeface="+mn-lt"/>
-                <a:ea typeface="+mn-ea"/>
-                <a:cs typeface="+mn-cs"/>
-              </a:defRPr>
-            </a:lvl4pPr>
-            <a:lvl5pPr marL="2057400" indent="-228600" algn="l" defTabSz="914400" rtl="0" eaLnBrk="1" latinLnBrk="0" hangingPunct="1">
-              <a:lnSpc>
-                <a:spcPct val="90000"/>
-              </a:lnSpc>
-              <a:spcBef>
-                <a:spcPts val="500"/>
-              </a:spcBef>
-              <a:buFont typeface="Arial" panose="020B0604020202020204" pitchFamily="34" charset="0"/>
-              <a:buChar char="•"/>
-              <a:defRPr sz="1800" kern="1200">
-                <a:solidFill>
-                  <a:schemeClr val="tx1"/>
-                </a:solidFill>
-                <a:latin typeface="+mn-lt"/>
-                <a:ea typeface="+mn-ea"/>
-                <a:cs typeface="+mn-cs"/>
-              </a:defRPr>
-            </a:lvl5pPr>
-            <a:lvl6pPr marL="2514600" indent="-228600" algn="l" defTabSz="914400" rtl="0" eaLnBrk="1" latinLnBrk="0" hangingPunct="1">
-              <a:lnSpc>
-                <a:spcPct val="90000"/>
-              </a:lnSpc>
-              <a:spcBef>
-                <a:spcPts val="500"/>
-              </a:spcBef>
-              <a:buFont typeface="Arial" panose="020B0604020202020204" pitchFamily="34" charset="0"/>
-              <a:buChar char="•"/>
-              <a:defRPr sz="1800" kern="1200">
-                <a:solidFill>
-                  <a:schemeClr val="tx1"/>
-                </a:solidFill>
-                <a:latin typeface="+mn-lt"/>
-                <a:ea typeface="+mn-ea"/>
-                <a:cs typeface="+mn-cs"/>
-              </a:defRPr>
-            </a:lvl6pPr>
-            <a:lvl7pPr marL="2971800" indent="-228600" algn="l" defTabSz="914400" rtl="0" eaLnBrk="1" latinLnBrk="0" hangingPunct="1">
-              <a:lnSpc>
-                <a:spcPct val="90000"/>
-              </a:lnSpc>
-              <a:spcBef>
-                <a:spcPts val="500"/>
-              </a:spcBef>
-              <a:buFont typeface="Arial" panose="020B0604020202020204" pitchFamily="34" charset="0"/>
-              <a:buChar char="•"/>
-              <a:defRPr sz="1800" kern="1200">
-                <a:solidFill>
-                  <a:schemeClr val="tx1"/>
-                </a:solidFill>
-                <a:latin typeface="+mn-lt"/>
-                <a:ea typeface="+mn-ea"/>
-                <a:cs typeface="+mn-cs"/>
-              </a:defRPr>
-            </a:lvl7pPr>
-            <a:lvl8pPr marL="3429000" indent="-228600" algn="l" defTabSz="914400" rtl="0" eaLnBrk="1" latinLnBrk="0" hangingPunct="1">
-              <a:lnSpc>
-                <a:spcPct val="90000"/>
-              </a:lnSpc>
-              <a:spcBef>
-                <a:spcPts val="500"/>
-              </a:spcBef>
-              <a:buFont typeface="Arial" panose="020B0604020202020204" pitchFamily="34" charset="0"/>
-              <a:buChar char="•"/>
-              <a:defRPr sz="1800" kern="1200">
-                <a:solidFill>
-                  <a:schemeClr val="tx1"/>
-                </a:solidFill>
-                <a:latin typeface="+mn-lt"/>
-                <a:ea typeface="+mn-ea"/>
-                <a:cs typeface="+mn-cs"/>
-              </a:defRPr>
-            </a:lvl8pPr>
-            <a:lvl9pPr marL="3886200" indent="-228600" algn="l" defTabSz="914400" rtl="0" eaLnBrk="1" latinLnBrk="0" hangingPunct="1">
-              <a:lnSpc>
-                <a:spcPct val="90000"/>
-              </a:lnSpc>
-              <a:spcBef>
-                <a:spcPts val="500"/>
-              </a:spcBef>
-              <a:buFont typeface="Arial" panose="020B0604020202020204" pitchFamily="34" charset="0"/>
-              <a:buChar char="•"/>
-              <a:defRPr sz="1800" kern="1200">
-                <a:solidFill>
-                  <a:schemeClr val="tx1"/>
-                </a:solidFill>
-                <a:latin typeface="+mn-lt"/>
-                <a:ea typeface="+mn-ea"/>
-                <a:cs typeface="+mn-cs"/>
-              </a:defRPr>
-            </a:lvl9pPr>
-          </a:lstStyle>
-          <a:p>
-            <a:endParaRPr lang="en-US" dirty="0"/>
-          </a:p>
-        </p:txBody>
-      </p:sp>
-      <p:sp>
-        <p:nvSpPr>
-          <p:cNvPr id="8" name="Content Placeholder 5">
-            <a:extLst>
-              <a:ext uri="{FF2B5EF4-FFF2-40B4-BE49-F238E27FC236}">
-                <a16:creationId xmlns:a16="http://schemas.microsoft.com/office/drawing/2014/main" id="{47A10964-59B1-AA4F-BF68-148D7AE5D94B}"/>
-              </a:ext>
-            </a:extLst>
-          </p:cNvPr>
-          <p:cNvSpPr txBox="1">
-            <a:spLocks/>
-          </p:cNvSpPr>
-          <p:nvPr/>
-        </p:nvSpPr>
-        <p:spPr>
-          <a:xfrm>
-            <a:off x="838200" y="1616145"/>
-            <a:ext cx="10515600" cy="4351338"/>
-          </a:xfrm>
-          <a:prstGeom prst="rect">
-            <a:avLst/>
-          </a:prstGeom>
-        </p:spPr>
-        <p:txBody>
-          <a:bodyPr vert="horz" lIns="91440" tIns="45720" rIns="91440" bIns="45720" rtlCol="0">
-            <a:normAutofit/>
-          </a:bodyPr>
-          <a:lstStyle>
-            <a:lvl1pPr marL="228600" indent="-228600" algn="l" defTabSz="914400" rtl="0" eaLnBrk="1" latinLnBrk="0" hangingPunct="1">
-              <a:lnSpc>
-                <a:spcPct val="90000"/>
-              </a:lnSpc>
-              <a:spcBef>
-                <a:spcPts val="1000"/>
-              </a:spcBef>
-              <a:buFont typeface="Arial" panose="020B0604020202020204" pitchFamily="34" charset="0"/>
-              <a:buChar char="•"/>
-              <a:defRPr sz="2800" kern="1200">
-                <a:solidFill>
-                  <a:schemeClr val="tx1"/>
-                </a:solidFill>
-                <a:latin typeface="+mn-lt"/>
-                <a:ea typeface="+mn-ea"/>
-                <a:cs typeface="+mn-cs"/>
-              </a:defRPr>
-            </a:lvl1pPr>
-            <a:lvl2pPr marL="685800" indent="-228600" algn="l" defTabSz="914400" rtl="0" eaLnBrk="1" latinLnBrk="0" hangingPunct="1">
-              <a:lnSpc>
-                <a:spcPct val="90000"/>
-              </a:lnSpc>
-              <a:spcBef>
-                <a:spcPts val="500"/>
-              </a:spcBef>
-              <a:buFont typeface="Arial" panose="020B0604020202020204" pitchFamily="34" charset="0"/>
-              <a:buChar char="•"/>
-              <a:defRPr sz="2400" kern="1200">
-                <a:solidFill>
-                  <a:schemeClr val="tx1"/>
-                </a:solidFill>
-                <a:latin typeface="+mn-lt"/>
-                <a:ea typeface="+mn-ea"/>
-                <a:cs typeface="+mn-cs"/>
-              </a:defRPr>
-            </a:lvl2pPr>
-            <a:lvl3pPr marL="1143000" indent="-228600" algn="l" defTabSz="914400" rtl="0" eaLnBrk="1" latinLnBrk="0" hangingPunct="1">
-              <a:lnSpc>
-                <a:spcPct val="90000"/>
-              </a:lnSpc>
-              <a:spcBef>
-                <a:spcPts val="500"/>
-              </a:spcBef>
-              <a:buFont typeface="Arial" panose="020B0604020202020204" pitchFamily="34" charset="0"/>
-              <a:buChar char="•"/>
-              <a:defRPr sz="2000" kern="1200">
-                <a:solidFill>
-                  <a:schemeClr val="tx1"/>
-                </a:solidFill>
-                <a:latin typeface="+mn-lt"/>
-                <a:ea typeface="+mn-ea"/>
-                <a:cs typeface="+mn-cs"/>
-              </a:defRPr>
-            </a:lvl3pPr>
-            <a:lvl4pPr marL="1600200" indent="-228600" algn="l" defTabSz="914400" rtl="0" eaLnBrk="1" latinLnBrk="0" hangingPunct="1">
-              <a:lnSpc>
-                <a:spcPct val="90000"/>
-              </a:lnSpc>
-              <a:spcBef>
-                <a:spcPts val="500"/>
-              </a:spcBef>
-              <a:buFont typeface="Arial" panose="020B0604020202020204" pitchFamily="34" charset="0"/>
-              <a:buChar char="•"/>
-              <a:defRPr sz="1800" kern="1200">
-                <a:solidFill>
-                  <a:schemeClr val="tx1"/>
-                </a:solidFill>
-                <a:latin typeface="+mn-lt"/>
-                <a:ea typeface="+mn-ea"/>
-                <a:cs typeface="+mn-cs"/>
-              </a:defRPr>
-            </a:lvl4pPr>
-            <a:lvl5pPr marL="2057400" indent="-228600" algn="l" defTabSz="914400" rtl="0" eaLnBrk="1" latinLnBrk="0" hangingPunct="1">
-              <a:lnSpc>
-                <a:spcPct val="90000"/>
-              </a:lnSpc>
-              <a:spcBef>
-                <a:spcPts val="500"/>
-              </a:spcBef>
-              <a:buFont typeface="Arial" panose="020B0604020202020204" pitchFamily="34" charset="0"/>
-              <a:buChar char="•"/>
-              <a:defRPr sz="1800" kern="1200">
-                <a:solidFill>
-                  <a:schemeClr val="tx1"/>
-                </a:solidFill>
-                <a:latin typeface="+mn-lt"/>
-                <a:ea typeface="+mn-ea"/>
-                <a:cs typeface="+mn-cs"/>
-              </a:defRPr>
-            </a:lvl5pPr>
-            <a:lvl6pPr marL="2514600" indent="-228600" algn="l" defTabSz="914400" rtl="0" eaLnBrk="1" latinLnBrk="0" hangingPunct="1">
-              <a:lnSpc>
-                <a:spcPct val="90000"/>
-              </a:lnSpc>
-              <a:spcBef>
-                <a:spcPts val="500"/>
-              </a:spcBef>
-              <a:buFont typeface="Arial" panose="020B0604020202020204" pitchFamily="34" charset="0"/>
-              <a:buChar char="•"/>
-              <a:defRPr sz="1800" kern="1200">
-                <a:solidFill>
-                  <a:schemeClr val="tx1"/>
-                </a:solidFill>
-                <a:latin typeface="+mn-lt"/>
-                <a:ea typeface="+mn-ea"/>
-                <a:cs typeface="+mn-cs"/>
-              </a:defRPr>
-            </a:lvl6pPr>
-            <a:lvl7pPr marL="2971800" indent="-228600" algn="l" defTabSz="914400" rtl="0" eaLnBrk="1" latinLnBrk="0" hangingPunct="1">
-              <a:lnSpc>
-                <a:spcPct val="90000"/>
-              </a:lnSpc>
-              <a:spcBef>
-                <a:spcPts val="500"/>
-              </a:spcBef>
-              <a:buFont typeface="Arial" panose="020B0604020202020204" pitchFamily="34" charset="0"/>
-              <a:buChar char="•"/>
-              <a:defRPr sz="1800" kern="1200">
-                <a:solidFill>
-                  <a:schemeClr val="tx1"/>
-                </a:solidFill>
-                <a:latin typeface="+mn-lt"/>
-                <a:ea typeface="+mn-ea"/>
-                <a:cs typeface="+mn-cs"/>
-              </a:defRPr>
-            </a:lvl7pPr>
-            <a:lvl8pPr marL="3429000" indent="-228600" algn="l" defTabSz="914400" rtl="0" eaLnBrk="1" latinLnBrk="0" hangingPunct="1">
-              <a:lnSpc>
-                <a:spcPct val="90000"/>
-              </a:lnSpc>
-              <a:spcBef>
-                <a:spcPts val="500"/>
-              </a:spcBef>
-              <a:buFont typeface="Arial" panose="020B0604020202020204" pitchFamily="34" charset="0"/>
-              <a:buChar char="•"/>
-              <a:defRPr sz="1800" kern="1200">
-                <a:solidFill>
-                  <a:schemeClr val="tx1"/>
-                </a:solidFill>
-                <a:latin typeface="+mn-lt"/>
-                <a:ea typeface="+mn-ea"/>
-                <a:cs typeface="+mn-cs"/>
-              </a:defRPr>
-            </a:lvl8pPr>
-            <a:lvl9pPr marL="3886200" indent="-228600" algn="l" defTabSz="914400" rtl="0" eaLnBrk="1" latinLnBrk="0" hangingPunct="1">
-              <a:lnSpc>
-                <a:spcPct val="90000"/>
-              </a:lnSpc>
-              <a:spcBef>
-                <a:spcPts val="500"/>
-              </a:spcBef>
-              <a:buFont typeface="Arial" panose="020B0604020202020204" pitchFamily="34" charset="0"/>
-              <a:buChar char="•"/>
-              <a:defRPr sz="1800" kern="1200">
-                <a:solidFill>
-                  <a:schemeClr val="tx1"/>
-                </a:solidFill>
-                <a:latin typeface="+mn-lt"/>
-                <a:ea typeface="+mn-ea"/>
-                <a:cs typeface="+mn-cs"/>
-              </a:defRPr>
-            </a:lvl9pPr>
-          </a:lstStyle>
-          <a:p>
-            <a:r>
-              <a:rPr lang="en-US" dirty="0"/>
-              <a:t>The process where you automatically or manually select those features which contribute most to your prediction variable</a:t>
-            </a:r>
-          </a:p>
-          <a:p>
-            <a:r>
-              <a:rPr lang="en-US" dirty="0"/>
-              <a:t>Irrelevant or partially relevant features can negatively impact model performance.</a:t>
-            </a:r>
-          </a:p>
-          <a:p>
-            <a:r>
-              <a:rPr lang="en-US" dirty="0"/>
-              <a:t>Benefits:</a:t>
-            </a:r>
-          </a:p>
-          <a:p>
-            <a:pPr lvl="1"/>
-            <a:r>
-              <a:rPr lang="en-US" dirty="0"/>
-              <a:t>Reduces overfitting</a:t>
-            </a:r>
-          </a:p>
-          <a:p>
-            <a:pPr lvl="1"/>
-            <a:r>
-              <a:rPr lang="en-US" dirty="0"/>
-              <a:t>Improves accuracy</a:t>
-            </a:r>
-          </a:p>
-          <a:p>
-            <a:pPr lvl="1"/>
-            <a:r>
-              <a:rPr lang="en-US" dirty="0"/>
-              <a:t>Reduces training time</a:t>
-            </a:r>
-          </a:p>
-        </p:txBody>
-      </p:sp>
     </p:spTree>
     <p:extLst>
       <p:ext uri="{BB962C8B-B14F-4D97-AF65-F5344CB8AC3E}">
-        <p14:creationId xmlns:p14="http://schemas.microsoft.com/office/powerpoint/2010/main" val="109887869"/>
+        <p14:creationId xmlns:p14="http://schemas.microsoft.com/office/powerpoint/2010/main" val="1245804402"/>
       </p:ext>
     </p:extLst>
   </p:cSld>

</xml_diff>